<commit_message>
made changes to report
</commit_message>
<xml_diff>
--- a/presentations/Search Engine for Movie Cast Generation.pptx
+++ b/presentations/Search Engine for Movie Cast Generation.pptx
@@ -231,7 +231,7 @@
           <a:p>
             <a:fld id="{3DF2EC88-286B-4813-8C78-642F78CAE695}" type="datetimeFigureOut">
               <a:rPr lang="en-US" smtClean="0"/>
-              <a:t>4/4/2020</a:t>
+              <a:t>4/17/2020</a:t>
             </a:fld>
             <a:endParaRPr lang="en-US"/>
           </a:p>
@@ -642,7 +642,7 @@
           <a:p>
             <a:fld id="{E23F7EE3-9495-417C-81C5-20DE4C193D39}" type="datetimeFigureOut">
               <a:rPr lang="en-GB" smtClean="0"/>
-              <a:t>04/04/2020</a:t>
+              <a:t>17/04/2020</a:t>
             </a:fld>
             <a:endParaRPr lang="en-GB"/>
           </a:p>
@@ -5234,7 +5234,7 @@
           <a:p>
             <a:fld id="{E23F7EE3-9495-417C-81C5-20DE4C193D39}" type="datetimeFigureOut">
               <a:rPr lang="en-GB" smtClean="0"/>
-              <a:t>05/04/2020</a:t>
+              <a:t>17/04/2020</a:t>
             </a:fld>
             <a:endParaRPr lang="en-GB"/>
           </a:p>
@@ -8399,7 +8399,7 @@
           <a:p>
             <a:fld id="{E23F7EE3-9495-417C-81C5-20DE4C193D39}" type="datetimeFigureOut">
               <a:rPr lang="en-GB" smtClean="0"/>
-              <a:t>05/04/2020</a:t>
+              <a:t>17/04/2020</a:t>
             </a:fld>
             <a:endParaRPr lang="en-GB"/>
           </a:p>
@@ -17167,7 +17167,7 @@
           <a:p>
             <a:fld id="{E23F7EE3-9495-417C-81C5-20DE4C193D39}" type="datetimeFigureOut">
               <a:rPr lang="en-GB" smtClean="0"/>
-              <a:t>04/04/2020</a:t>
+              <a:t>17/04/2020</a:t>
             </a:fld>
             <a:endParaRPr lang="en-GB"/>
           </a:p>
@@ -20398,7 +20398,7 @@
           <a:p>
             <a:fld id="{E23F7EE3-9495-417C-81C5-20DE4C193D39}" type="datetimeFigureOut">
               <a:rPr lang="en-GB" smtClean="0"/>
-              <a:t>05/04/2020</a:t>
+              <a:t>17/04/2020</a:t>
             </a:fld>
             <a:endParaRPr lang="en-GB"/>
           </a:p>
@@ -23621,7 +23621,7 @@
           <a:p>
             <a:fld id="{E23F7EE3-9495-417C-81C5-20DE4C193D39}" type="datetimeFigureOut">
               <a:rPr lang="en-GB" smtClean="0"/>
-              <a:t>05/04/2020</a:t>
+              <a:t>17/04/2020</a:t>
             </a:fld>
             <a:endParaRPr lang="en-GB"/>
           </a:p>
@@ -26991,7 +26991,7 @@
           <a:p>
             <a:fld id="{E23F7EE3-9495-417C-81C5-20DE4C193D39}" type="datetimeFigureOut">
               <a:rPr lang="en-GB" smtClean="0"/>
-              <a:t>05/04/2020</a:t>
+              <a:t>17/04/2020</a:t>
             </a:fld>
             <a:endParaRPr lang="en-GB"/>
           </a:p>
@@ -30088,7 +30088,7 @@
           <a:p>
             <a:fld id="{E23F7EE3-9495-417C-81C5-20DE4C193D39}" type="datetimeFigureOut">
               <a:rPr lang="en-GB" smtClean="0"/>
-              <a:t>05/04/2020</a:t>
+              <a:t>17/04/2020</a:t>
             </a:fld>
             <a:endParaRPr lang="en-GB"/>
           </a:p>
@@ -33156,7 +33156,7 @@
           <a:p>
             <a:fld id="{E23F7EE3-9495-417C-81C5-20DE4C193D39}" type="datetimeFigureOut">
               <a:rPr lang="en-GB" smtClean="0"/>
-              <a:t>05/04/2020</a:t>
+              <a:t>17/04/2020</a:t>
             </a:fld>
             <a:endParaRPr lang="en-GB"/>
           </a:p>
@@ -36424,7 +36424,7 @@
           <a:p>
             <a:fld id="{E23F7EE3-9495-417C-81C5-20DE4C193D39}" type="datetimeFigureOut">
               <a:rPr lang="en-GB" smtClean="0"/>
-              <a:t>05/04/2020</a:t>
+              <a:t>17/04/2020</a:t>
             </a:fld>
             <a:endParaRPr lang="en-GB"/>
           </a:p>
@@ -39668,7 +39668,7 @@
           <a:p>
             <a:fld id="{E23F7EE3-9495-417C-81C5-20DE4C193D39}" type="datetimeFigureOut">
               <a:rPr lang="en-GB" smtClean="0"/>
-              <a:t>05/04/2020</a:t>
+              <a:t>17/04/2020</a:t>
             </a:fld>
             <a:endParaRPr lang="en-GB"/>
           </a:p>
@@ -42869,7 +42869,7 @@
           <a:p>
             <a:fld id="{E23F7EE3-9495-417C-81C5-20DE4C193D39}" type="datetimeFigureOut">
               <a:rPr lang="en-GB" smtClean="0"/>
-              <a:t>04/04/2020</a:t>
+              <a:t>17/04/2020</a:t>
             </a:fld>
             <a:endParaRPr lang="en-GB"/>
           </a:p>
@@ -47527,7 +47527,7 @@
           <a:graphicData uri="http://schemas.openxmlformats.org/presentationml/2006/ole">
             <mc:AlternateContent xmlns:mc="http://schemas.openxmlformats.org/markup-compatibility/2006">
               <mc:Choice xmlns:v="urn:schemas-microsoft-com:vml" Requires="v">
-                <p:oleObj spid="_x0000_s1047" name="Worksheet" r:id="rId4" imgW="1283988" imgH="369484" progId="Excel.Sheet.12">
+                <p:oleObj spid="_x0000_s1049" name="Worksheet" r:id="rId4" imgW="1283988" imgH="369484" progId="Excel.Sheet.12">
                   <p:embed/>
                 </p:oleObj>
               </mc:Choice>

</xml_diff>

<commit_message>
vertical workflow in report
</commit_message>
<xml_diff>
--- a/presentations/Search Engine for Movie Cast Generation.pptx
+++ b/presentations/Search Engine for Movie Cast Generation.pptx
@@ -5,7 +5,7 @@
     <p:sldMasterId id="2147483648" r:id="rId1"/>
   </p:sldMasterIdLst>
   <p:notesMasterIdLst>
-    <p:notesMasterId r:id="rId25"/>
+    <p:notesMasterId r:id="rId26"/>
   </p:notesMasterIdLst>
   <p:sldIdLst>
     <p:sldId id="256" r:id="rId2"/>
@@ -17,20 +17,21 @@
     <p:sldId id="285" r:id="rId8"/>
     <p:sldId id="274" r:id="rId9"/>
     <p:sldId id="260" r:id="rId10"/>
-    <p:sldId id="275" r:id="rId11"/>
-    <p:sldId id="264" r:id="rId12"/>
-    <p:sldId id="265" r:id="rId13"/>
-    <p:sldId id="286" r:id="rId14"/>
-    <p:sldId id="266" r:id="rId15"/>
-    <p:sldId id="267" r:id="rId16"/>
-    <p:sldId id="268" r:id="rId17"/>
-    <p:sldId id="287" r:id="rId18"/>
-    <p:sldId id="284" r:id="rId19"/>
-    <p:sldId id="288" r:id="rId20"/>
-    <p:sldId id="289" r:id="rId21"/>
-    <p:sldId id="290" r:id="rId22"/>
-    <p:sldId id="263" r:id="rId23"/>
-    <p:sldId id="283" r:id="rId24"/>
+    <p:sldId id="292" r:id="rId11"/>
+    <p:sldId id="275" r:id="rId12"/>
+    <p:sldId id="264" r:id="rId13"/>
+    <p:sldId id="265" r:id="rId14"/>
+    <p:sldId id="286" r:id="rId15"/>
+    <p:sldId id="266" r:id="rId16"/>
+    <p:sldId id="267" r:id="rId17"/>
+    <p:sldId id="268" r:id="rId18"/>
+    <p:sldId id="287" r:id="rId19"/>
+    <p:sldId id="284" r:id="rId20"/>
+    <p:sldId id="288" r:id="rId21"/>
+    <p:sldId id="289" r:id="rId22"/>
+    <p:sldId id="290" r:id="rId23"/>
+    <p:sldId id="263" r:id="rId24"/>
+    <p:sldId id="283" r:id="rId25"/>
   </p:sldIdLst>
   <p:sldSz cx="12192000" cy="6858000"/>
   <p:notesSz cx="6858000" cy="9144000"/>
@@ -139,7 +140,7 @@
 
 <file path=ppt/commentAuthors.xml><?xml version="1.0" encoding="utf-8"?>
 <p:cmAuthorLst xmlns:a="http://schemas.openxmlformats.org/drawingml/2006/main" xmlns:r="http://schemas.openxmlformats.org/officeDocument/2006/relationships" xmlns:p="http://schemas.openxmlformats.org/presentationml/2006/main">
-  <p:cmAuthor id="1" name="Malavika Ramakrishnan" initials="MR" lastIdx="1" clrIdx="0">
+  <p:cmAuthor id="1" name="Malavika Ramakrishnan" initials="MR" lastIdx="2" clrIdx="0">
     <p:extLst>
       <p:ext uri="{19B8F6BF-5375-455C-9EA6-DF929625EA0E}">
         <p15:presenceInfo xmlns:p15="http://schemas.microsoft.com/office/powerpoint/2012/main" userId="d2780ba6c2419c84" providerId="Windows Live"/>
@@ -231,7 +232,7 @@
           <a:p>
             <a:fld id="{3DF2EC88-286B-4813-8C78-642F78CAE695}" type="datetimeFigureOut">
               <a:rPr lang="en-US" smtClean="0"/>
-              <a:t>4/17/2020</a:t>
+              <a:t>4/19/2020</a:t>
             </a:fld>
             <a:endParaRPr lang="en-US"/>
           </a:p>
@@ -642,7 +643,7 @@
           <a:p>
             <a:fld id="{E23F7EE3-9495-417C-81C5-20DE4C193D39}" type="datetimeFigureOut">
               <a:rPr lang="en-GB" smtClean="0"/>
-              <a:t>17/04/2020</a:t>
+              <a:t>19/04/2020</a:t>
             </a:fld>
             <a:endParaRPr lang="en-GB"/>
           </a:p>
@@ -5234,7 +5235,7 @@
           <a:p>
             <a:fld id="{E23F7EE3-9495-417C-81C5-20DE4C193D39}" type="datetimeFigureOut">
               <a:rPr lang="en-GB" smtClean="0"/>
-              <a:t>17/04/2020</a:t>
+              <a:t>19/04/2020</a:t>
             </a:fld>
             <a:endParaRPr lang="en-GB"/>
           </a:p>
@@ -8399,7 +8400,7 @@
           <a:p>
             <a:fld id="{E23F7EE3-9495-417C-81C5-20DE4C193D39}" type="datetimeFigureOut">
               <a:rPr lang="en-GB" smtClean="0"/>
-              <a:t>17/04/2020</a:t>
+              <a:t>19/04/2020</a:t>
             </a:fld>
             <a:endParaRPr lang="en-GB"/>
           </a:p>
@@ -17167,7 +17168,7 @@
           <a:p>
             <a:fld id="{E23F7EE3-9495-417C-81C5-20DE4C193D39}" type="datetimeFigureOut">
               <a:rPr lang="en-GB" smtClean="0"/>
-              <a:t>17/04/2020</a:t>
+              <a:t>19/04/2020</a:t>
             </a:fld>
             <a:endParaRPr lang="en-GB"/>
           </a:p>
@@ -20398,7 +20399,7 @@
           <a:p>
             <a:fld id="{E23F7EE3-9495-417C-81C5-20DE4C193D39}" type="datetimeFigureOut">
               <a:rPr lang="en-GB" smtClean="0"/>
-              <a:t>17/04/2020</a:t>
+              <a:t>19/04/2020</a:t>
             </a:fld>
             <a:endParaRPr lang="en-GB"/>
           </a:p>
@@ -23621,7 +23622,7 @@
           <a:p>
             <a:fld id="{E23F7EE3-9495-417C-81C5-20DE4C193D39}" type="datetimeFigureOut">
               <a:rPr lang="en-GB" smtClean="0"/>
-              <a:t>17/04/2020</a:t>
+              <a:t>19/04/2020</a:t>
             </a:fld>
             <a:endParaRPr lang="en-GB"/>
           </a:p>
@@ -26991,7 +26992,7 @@
           <a:p>
             <a:fld id="{E23F7EE3-9495-417C-81C5-20DE4C193D39}" type="datetimeFigureOut">
               <a:rPr lang="en-GB" smtClean="0"/>
-              <a:t>17/04/2020</a:t>
+              <a:t>19/04/2020</a:t>
             </a:fld>
             <a:endParaRPr lang="en-GB"/>
           </a:p>
@@ -30088,7 +30089,7 @@
           <a:p>
             <a:fld id="{E23F7EE3-9495-417C-81C5-20DE4C193D39}" type="datetimeFigureOut">
               <a:rPr lang="en-GB" smtClean="0"/>
-              <a:t>17/04/2020</a:t>
+              <a:t>19/04/2020</a:t>
             </a:fld>
             <a:endParaRPr lang="en-GB"/>
           </a:p>
@@ -33156,7 +33157,7 @@
           <a:p>
             <a:fld id="{E23F7EE3-9495-417C-81C5-20DE4C193D39}" type="datetimeFigureOut">
               <a:rPr lang="en-GB" smtClean="0"/>
-              <a:t>17/04/2020</a:t>
+              <a:t>19/04/2020</a:t>
             </a:fld>
             <a:endParaRPr lang="en-GB"/>
           </a:p>
@@ -36424,7 +36425,7 @@
           <a:p>
             <a:fld id="{E23F7EE3-9495-417C-81C5-20DE4C193D39}" type="datetimeFigureOut">
               <a:rPr lang="en-GB" smtClean="0"/>
-              <a:t>17/04/2020</a:t>
+              <a:t>19/04/2020</a:t>
             </a:fld>
             <a:endParaRPr lang="en-GB"/>
           </a:p>
@@ -39668,7 +39669,7 @@
           <a:p>
             <a:fld id="{E23F7EE3-9495-417C-81C5-20DE4C193D39}" type="datetimeFigureOut">
               <a:rPr lang="en-GB" smtClean="0"/>
-              <a:t>17/04/2020</a:t>
+              <a:t>19/04/2020</a:t>
             </a:fld>
             <a:endParaRPr lang="en-GB"/>
           </a:p>
@@ -42869,7 +42870,7 @@
           <a:p>
             <a:fld id="{E23F7EE3-9495-417C-81C5-20DE4C193D39}" type="datetimeFigureOut">
               <a:rPr lang="en-GB" smtClean="0"/>
-              <a:t>17/04/2020</a:t>
+              <a:t>19/04/2020</a:t>
             </a:fld>
             <a:endParaRPr lang="en-GB"/>
           </a:p>
@@ -43435,7 +43436,7 @@
           <a:p>
             <a:r>
               <a:rPr lang="en-US" dirty="0"/>
-              <a:t>Process Flow</a:t>
+              <a:t>Process Flow - Spark</a:t>
             </a:r>
           </a:p>
         </p:txBody>
@@ -43454,7 +43455,7 @@
         </p:nvSpPr>
         <p:spPr>
           <a:xfrm>
-            <a:off x="4073546" y="3768395"/>
+            <a:off x="6365376" y="3529320"/>
             <a:ext cx="1512000" cy="540000"/>
           </a:xfrm>
           <a:prstGeom prst="rect">
@@ -43489,18 +43490,13 @@
           <a:p>
             <a:pPr algn="ctr"/>
             <a:r>
-              <a:rPr lang="en-US" dirty="0" err="1">
+              <a:rPr lang="en-US" dirty="0">
                 <a:solidFill>
                   <a:schemeClr val="tx1"/>
                 </a:solidFill>
               </a:rPr>
-              <a:t>actor_gen</a:t>
+              <a:t>Find best actors</a:t>
             </a:r>
-            <a:endParaRPr lang="en-US" dirty="0">
-              <a:solidFill>
-                <a:schemeClr val="tx1"/>
-              </a:solidFill>
-            </a:endParaRPr>
           </a:p>
         </p:txBody>
       </p:sp>
@@ -43518,7 +43514,7 @@
         </p:nvSpPr>
         <p:spPr>
           <a:xfrm>
-            <a:off x="6214546" y="3768395"/>
+            <a:off x="6365376" y="4636474"/>
             <a:ext cx="1512000" cy="540000"/>
           </a:xfrm>
           <a:prstGeom prst="rect">
@@ -43553,18 +43549,13 @@
           <a:p>
             <a:pPr algn="ctr"/>
             <a:r>
-              <a:rPr lang="en-US" dirty="0" err="1">
+              <a:rPr lang="en-US" dirty="0">
                 <a:solidFill>
                   <a:schemeClr val="tx1"/>
                 </a:solidFill>
               </a:rPr>
-              <a:t>actor_ranked</a:t>
+              <a:t>Calculate relationships</a:t>
             </a:r>
-            <a:endParaRPr lang="en-US" dirty="0">
-              <a:solidFill>
-                <a:schemeClr val="tx1"/>
-              </a:solidFill>
-            </a:endParaRPr>
           </a:p>
         </p:txBody>
       </p:sp>
@@ -43582,7 +43573,7 @@
         </p:nvSpPr>
         <p:spPr>
           <a:xfrm>
-            <a:off x="8355546" y="3768395"/>
+            <a:off x="6365376" y="5502905"/>
             <a:ext cx="1512000" cy="540000"/>
           </a:xfrm>
           <a:prstGeom prst="rect">
@@ -43617,18 +43608,13 @@
           <a:p>
             <a:pPr algn="ctr"/>
             <a:r>
-              <a:rPr lang="en-US" dirty="0" err="1">
+              <a:rPr lang="en-US" dirty="0">
                 <a:solidFill>
                   <a:schemeClr val="tx1"/>
                 </a:solidFill>
               </a:rPr>
-              <a:t>relation_score</a:t>
+              <a:t>Find best groups</a:t>
             </a:r>
-            <a:endParaRPr lang="en-US" dirty="0">
-              <a:solidFill>
-                <a:schemeClr val="tx1"/>
-              </a:solidFill>
-            </a:endParaRPr>
           </a:p>
         </p:txBody>
       </p:sp>
@@ -43646,8 +43632,8 @@
         </p:nvSpPr>
         <p:spPr>
           <a:xfrm>
-            <a:off x="4073546" y="2594858"/>
-            <a:ext cx="1512000" cy="540000"/>
+            <a:off x="3790877" y="2371695"/>
+            <a:ext cx="1485005" cy="540000"/>
           </a:xfrm>
           <a:prstGeom prst="rect">
             <a:avLst/>
@@ -43693,10 +43679,10 @@
       </p:sp>
       <p:sp>
         <p:nvSpPr>
-          <p:cNvPr id="17" name="Rectangle 16">
+          <p:cNvPr id="44" name="Rectangle 43">
             <a:extLst>
               <a:ext uri="{FF2B5EF4-FFF2-40B4-BE49-F238E27FC236}">
-                <a16:creationId xmlns:a16="http://schemas.microsoft.com/office/drawing/2014/main" id="{537513AC-794A-494D-9A1C-5A705D0D0289}"/>
+                <a16:creationId xmlns:a16="http://schemas.microsoft.com/office/drawing/2014/main" id="{878DAF90-F1FD-4BDF-B8C9-CE55FDCA3EEF}"/>
               </a:ext>
             </a:extLst>
           </p:cNvPr>
@@ -43705,8 +43691,8 @@
         </p:nvSpPr>
         <p:spPr>
           <a:xfrm>
-            <a:off x="4073546" y="4961795"/>
-            <a:ext cx="1512000" cy="540000"/>
+            <a:off x="9215560" y="5502905"/>
+            <a:ext cx="1747080" cy="540000"/>
           </a:xfrm>
           <a:prstGeom prst="rect">
             <a:avLst/>
@@ -43740,385 +43726,13 @@
           <a:p>
             <a:pPr algn="ctr"/>
             <a:r>
-              <a:rPr lang="en-US" dirty="0">
+              <a:rPr lang="en-US" b="1" dirty="0">
                 <a:solidFill>
                   <a:schemeClr val="tx1"/>
                 </a:solidFill>
               </a:rPr>
-              <a:t>output.txt</a:t>
+              <a:t>Groups</a:t>
             </a:r>
-          </a:p>
-        </p:txBody>
-      </p:sp>
-      <p:cxnSp>
-        <p:nvCxnSpPr>
-          <p:cNvPr id="19" name="Straight Arrow Connector 18">
-            <a:extLst>
-              <a:ext uri="{FF2B5EF4-FFF2-40B4-BE49-F238E27FC236}">
-                <a16:creationId xmlns:a16="http://schemas.microsoft.com/office/drawing/2014/main" id="{6F99E1C1-7470-49C0-8081-6A3D5E511E06}"/>
-              </a:ext>
-            </a:extLst>
-          </p:cNvPr>
-          <p:cNvCxnSpPr>
-            <a:stCxn id="16" idx="2"/>
-            <a:endCxn id="9" idx="0"/>
-          </p:cNvCxnSpPr>
-          <p:nvPr/>
-        </p:nvCxnSpPr>
-        <p:spPr>
-          <a:xfrm>
-            <a:off x="4829546" y="3134858"/>
-            <a:ext cx="0" cy="633537"/>
-          </a:xfrm>
-          <a:prstGeom prst="straightConnector1">
-            <a:avLst/>
-          </a:prstGeom>
-          <a:ln w="28575">
-            <a:solidFill>
-              <a:schemeClr val="tx1"/>
-            </a:solidFill>
-            <a:headEnd type="none" w="med" len="med"/>
-            <a:tailEnd type="arrow" w="med" len="med"/>
-          </a:ln>
-        </p:spPr>
-        <p:style>
-          <a:lnRef idx="1">
-            <a:schemeClr val="accent1"/>
-          </a:lnRef>
-          <a:fillRef idx="0">
-            <a:schemeClr val="accent1"/>
-          </a:fillRef>
-          <a:effectRef idx="0">
-            <a:schemeClr val="accent1"/>
-          </a:effectRef>
-          <a:fontRef idx="minor">
-            <a:schemeClr val="tx1"/>
-          </a:fontRef>
-        </p:style>
-      </p:cxnSp>
-      <p:cxnSp>
-        <p:nvCxnSpPr>
-          <p:cNvPr id="21" name="Straight Arrow Connector 20">
-            <a:extLst>
-              <a:ext uri="{FF2B5EF4-FFF2-40B4-BE49-F238E27FC236}">
-                <a16:creationId xmlns:a16="http://schemas.microsoft.com/office/drawing/2014/main" id="{2FDD322F-E586-4FA6-A930-FD64E2C38C87}"/>
-              </a:ext>
-            </a:extLst>
-          </p:cNvPr>
-          <p:cNvCxnSpPr>
-            <a:cxnSpLocks/>
-            <a:stCxn id="9" idx="2"/>
-            <a:endCxn id="17" idx="0"/>
-          </p:cNvCxnSpPr>
-          <p:nvPr/>
-        </p:nvCxnSpPr>
-        <p:spPr>
-          <a:xfrm>
-            <a:off x="4829546" y="4308395"/>
-            <a:ext cx="0" cy="653400"/>
-          </a:xfrm>
-          <a:prstGeom prst="straightConnector1">
-            <a:avLst/>
-          </a:prstGeom>
-          <a:ln w="28575">
-            <a:solidFill>
-              <a:schemeClr val="tx1"/>
-            </a:solidFill>
-            <a:headEnd type="none" w="med" len="med"/>
-            <a:tailEnd type="arrow" w="med" len="med"/>
-          </a:ln>
-        </p:spPr>
-        <p:style>
-          <a:lnRef idx="1">
-            <a:schemeClr val="accent1"/>
-          </a:lnRef>
-          <a:fillRef idx="0">
-            <a:schemeClr val="accent1"/>
-          </a:fillRef>
-          <a:effectRef idx="0">
-            <a:schemeClr val="accent1"/>
-          </a:effectRef>
-          <a:fontRef idx="minor">
-            <a:schemeClr val="tx1"/>
-          </a:fontRef>
-        </p:style>
-      </p:cxnSp>
-      <p:cxnSp>
-        <p:nvCxnSpPr>
-          <p:cNvPr id="23" name="Connector: Elbow 22">
-            <a:extLst>
-              <a:ext uri="{FF2B5EF4-FFF2-40B4-BE49-F238E27FC236}">
-                <a16:creationId xmlns:a16="http://schemas.microsoft.com/office/drawing/2014/main" id="{BB5D08B3-2A4A-4191-9408-1E2BA7D18992}"/>
-              </a:ext>
-            </a:extLst>
-          </p:cNvPr>
-          <p:cNvCxnSpPr>
-            <a:cxnSpLocks/>
-            <a:stCxn id="17" idx="2"/>
-            <a:endCxn id="10" idx="1"/>
-          </p:cNvCxnSpPr>
-          <p:nvPr/>
-        </p:nvCxnSpPr>
-        <p:spPr>
-          <a:xfrm rot="5400000" flipH="1" flipV="1">
-            <a:off x="4790346" y="4077595"/>
-            <a:ext cx="1463400" cy="1385000"/>
-          </a:xfrm>
-          <a:prstGeom prst="bentConnector4">
-            <a:avLst>
-              <a:gd name="adj1" fmla="val -15621"/>
-              <a:gd name="adj2" fmla="val 77292"/>
-            </a:avLst>
-          </a:prstGeom>
-          <a:ln w="28575">
-            <a:solidFill>
-              <a:schemeClr val="tx1"/>
-            </a:solidFill>
-            <a:headEnd type="none" w="med" len="med"/>
-            <a:tailEnd type="arrow" w="med" len="med"/>
-          </a:ln>
-        </p:spPr>
-        <p:style>
-          <a:lnRef idx="1">
-            <a:schemeClr val="accent1"/>
-          </a:lnRef>
-          <a:fillRef idx="0">
-            <a:schemeClr val="accent1"/>
-          </a:fillRef>
-          <a:effectRef idx="0">
-            <a:schemeClr val="accent1"/>
-          </a:effectRef>
-          <a:fontRef idx="minor">
-            <a:schemeClr val="tx1"/>
-          </a:fontRef>
-        </p:style>
-      </p:cxnSp>
-      <p:sp>
-        <p:nvSpPr>
-          <p:cNvPr id="31" name="Rectangle 30">
-            <a:extLst>
-              <a:ext uri="{FF2B5EF4-FFF2-40B4-BE49-F238E27FC236}">
-                <a16:creationId xmlns:a16="http://schemas.microsoft.com/office/drawing/2014/main" id="{6C995979-964E-4BA7-AD25-39A92CD52E80}"/>
-              </a:ext>
-            </a:extLst>
-          </p:cNvPr>
-          <p:cNvSpPr/>
-          <p:nvPr/>
-        </p:nvSpPr>
-        <p:spPr>
-          <a:xfrm>
-            <a:off x="6214546" y="2594858"/>
-            <a:ext cx="1512000" cy="540000"/>
-          </a:xfrm>
-          <a:prstGeom prst="rect">
-            <a:avLst/>
-          </a:prstGeom>
-          <a:noFill/>
-          <a:ln>
-            <a:solidFill>
-              <a:schemeClr val="tx1"/>
-            </a:solidFill>
-          </a:ln>
-        </p:spPr>
-        <p:style>
-          <a:lnRef idx="2">
-            <a:schemeClr val="accent1">
-              <a:shade val="50000"/>
-            </a:schemeClr>
-          </a:lnRef>
-          <a:fillRef idx="1">
-            <a:schemeClr val="accent1"/>
-          </a:fillRef>
-          <a:effectRef idx="0">
-            <a:schemeClr val="accent1"/>
-          </a:effectRef>
-          <a:fontRef idx="minor">
-            <a:schemeClr val="lt1"/>
-          </a:fontRef>
-        </p:style>
-        <p:txBody>
-          <a:bodyPr rtlCol="0" anchor="ctr"/>
-          <a:lstStyle/>
-          <a:p>
-            <a:pPr algn="ctr"/>
-            <a:r>
-              <a:rPr lang="en-US" sz="1600" dirty="0">
-                <a:solidFill>
-                  <a:schemeClr val="tx1"/>
-                </a:solidFill>
-              </a:rPr>
-              <a:t>{}_</a:t>
-            </a:r>
-            <a:r>
-              <a:rPr lang="en-US" sz="1600" dirty="0" err="1">
-                <a:solidFill>
-                  <a:schemeClr val="tx1"/>
-                </a:solidFill>
-              </a:rPr>
-              <a:t>actor.tsv</a:t>
-            </a:r>
-            <a:endParaRPr lang="en-US" sz="1600" dirty="0">
-              <a:solidFill>
-                <a:schemeClr val="tx1"/>
-              </a:solidFill>
-            </a:endParaRPr>
-          </a:p>
-        </p:txBody>
-      </p:sp>
-      <p:cxnSp>
-        <p:nvCxnSpPr>
-          <p:cNvPr id="33" name="Straight Arrow Connector 32">
-            <a:extLst>
-              <a:ext uri="{FF2B5EF4-FFF2-40B4-BE49-F238E27FC236}">
-                <a16:creationId xmlns:a16="http://schemas.microsoft.com/office/drawing/2014/main" id="{8F9C4C29-03FC-4CB7-A3E2-EA043F212104}"/>
-              </a:ext>
-            </a:extLst>
-          </p:cNvPr>
-          <p:cNvCxnSpPr>
-            <a:stCxn id="10" idx="0"/>
-            <a:endCxn id="31" idx="2"/>
-          </p:cNvCxnSpPr>
-          <p:nvPr/>
-        </p:nvCxnSpPr>
-        <p:spPr>
-          <a:xfrm flipV="1">
-            <a:off x="6970546" y="3134858"/>
-            <a:ext cx="0" cy="633537"/>
-          </a:xfrm>
-          <a:prstGeom prst="straightConnector1">
-            <a:avLst/>
-          </a:prstGeom>
-          <a:ln w="28575">
-            <a:solidFill>
-              <a:schemeClr val="tx1"/>
-            </a:solidFill>
-            <a:headEnd type="none" w="med" len="med"/>
-            <a:tailEnd type="arrow" w="med" len="med"/>
-          </a:ln>
-        </p:spPr>
-        <p:style>
-          <a:lnRef idx="1">
-            <a:schemeClr val="accent1"/>
-          </a:lnRef>
-          <a:fillRef idx="0">
-            <a:schemeClr val="accent1"/>
-          </a:fillRef>
-          <a:effectRef idx="0">
-            <a:schemeClr val="accent1"/>
-          </a:effectRef>
-          <a:fontRef idx="minor">
-            <a:schemeClr val="tx1"/>
-          </a:fontRef>
-        </p:style>
-      </p:cxnSp>
-      <p:cxnSp>
-        <p:nvCxnSpPr>
-          <p:cNvPr id="39" name="Connector: Elbow 38">
-            <a:extLst>
-              <a:ext uri="{FF2B5EF4-FFF2-40B4-BE49-F238E27FC236}">
-                <a16:creationId xmlns:a16="http://schemas.microsoft.com/office/drawing/2014/main" id="{A9812A3D-335F-4213-BA11-C3715AFCFC69}"/>
-              </a:ext>
-            </a:extLst>
-          </p:cNvPr>
-          <p:cNvCxnSpPr>
-            <a:cxnSpLocks/>
-            <a:stCxn id="31" idx="3"/>
-            <a:endCxn id="11" idx="0"/>
-          </p:cNvCxnSpPr>
-          <p:nvPr/>
-        </p:nvCxnSpPr>
-        <p:spPr>
-          <a:xfrm>
-            <a:off x="7726546" y="2864858"/>
-            <a:ext cx="1385000" cy="903537"/>
-          </a:xfrm>
-          <a:prstGeom prst="bentConnector2">
-            <a:avLst/>
-          </a:prstGeom>
-          <a:ln w="28575">
-            <a:solidFill>
-              <a:schemeClr val="tx1"/>
-            </a:solidFill>
-            <a:headEnd type="none" w="med" len="med"/>
-            <a:tailEnd type="arrow" w="med" len="med"/>
-          </a:ln>
-        </p:spPr>
-        <p:style>
-          <a:lnRef idx="1">
-            <a:schemeClr val="accent1"/>
-          </a:lnRef>
-          <a:fillRef idx="0">
-            <a:schemeClr val="accent1"/>
-          </a:fillRef>
-          <a:effectRef idx="0">
-            <a:schemeClr val="accent1"/>
-          </a:effectRef>
-          <a:fontRef idx="minor">
-            <a:schemeClr val="tx1"/>
-          </a:fontRef>
-        </p:style>
-      </p:cxnSp>
-      <p:sp>
-        <p:nvSpPr>
-          <p:cNvPr id="44" name="Rectangle 43">
-            <a:extLst>
-              <a:ext uri="{FF2B5EF4-FFF2-40B4-BE49-F238E27FC236}">
-                <a16:creationId xmlns:a16="http://schemas.microsoft.com/office/drawing/2014/main" id="{878DAF90-F1FD-4BDF-B8C9-CE55FDCA3EEF}"/>
-              </a:ext>
-            </a:extLst>
-          </p:cNvPr>
-          <p:cNvSpPr/>
-          <p:nvPr/>
-        </p:nvSpPr>
-        <p:spPr>
-          <a:xfrm>
-            <a:off x="8355544" y="4961795"/>
-            <a:ext cx="1512000" cy="540000"/>
-          </a:xfrm>
-          <a:prstGeom prst="rect">
-            <a:avLst/>
-          </a:prstGeom>
-          <a:noFill/>
-          <a:ln>
-            <a:solidFill>
-              <a:schemeClr val="tx1"/>
-            </a:solidFill>
-          </a:ln>
-        </p:spPr>
-        <p:style>
-          <a:lnRef idx="2">
-            <a:schemeClr val="accent1">
-              <a:shade val="50000"/>
-            </a:schemeClr>
-          </a:lnRef>
-          <a:fillRef idx="1">
-            <a:schemeClr val="accent1"/>
-          </a:fillRef>
-          <a:effectRef idx="0">
-            <a:schemeClr val="accent1"/>
-          </a:effectRef>
-          <a:fontRef idx="minor">
-            <a:schemeClr val="lt1"/>
-          </a:fontRef>
-        </p:style>
-        <p:txBody>
-          <a:bodyPr rtlCol="0" anchor="ctr"/>
-          <a:lstStyle/>
-          <a:p>
-            <a:pPr algn="ctr"/>
-            <a:r>
-              <a:rPr lang="en-US" b="1" dirty="0" err="1">
-                <a:solidFill>
-                  <a:schemeClr val="tx1"/>
-                </a:solidFill>
-              </a:rPr>
-              <a:t>final.tsv</a:t>
-            </a:r>
-            <a:endParaRPr lang="en-US" b="1" dirty="0">
-              <a:solidFill>
-                <a:schemeClr val="tx1"/>
-              </a:solidFill>
-            </a:endParaRPr>
           </a:p>
         </p:txBody>
       </p:sp>
@@ -44133,15 +43747,15 @@
           </p:cNvPr>
           <p:cNvCxnSpPr>
             <a:cxnSpLocks/>
-            <a:stCxn id="11" idx="2"/>
-            <a:endCxn id="44" idx="0"/>
+            <a:stCxn id="11" idx="3"/>
+            <a:endCxn id="44" idx="1"/>
           </p:cNvCxnSpPr>
           <p:nvPr/>
         </p:nvCxnSpPr>
         <p:spPr>
-          <a:xfrm flipH="1">
-            <a:off x="9111544" y="4308395"/>
-            <a:ext cx="2" cy="653400"/>
+          <a:xfrm>
+            <a:off x="7877376" y="5772905"/>
+            <a:ext cx="1338184" cy="0"/>
           </a:xfrm>
           <a:prstGeom prst="straightConnector1">
             <a:avLst/>
@@ -44183,8 +43797,8 @@
         </p:nvSpPr>
         <p:spPr>
           <a:xfrm>
-            <a:off x="3568756" y="3482633"/>
-            <a:ext cx="7008113" cy="1152462"/>
+            <a:off x="5803661" y="3067842"/>
+            <a:ext cx="2568805" cy="3506615"/>
           </a:xfrm>
           <a:prstGeom prst="rect">
             <a:avLst/>
@@ -44218,14 +43832,11 @@
           <a:lstStyle/>
           <a:p>
             <a:pPr algn="ctr"/>
-            <a:r>
-              <a:rPr lang="en-US" dirty="0">
-                <a:solidFill>
-                  <a:schemeClr val="tx1"/>
-                </a:solidFill>
-              </a:rPr>
-              <a:t>Algorithms</a:t>
-            </a:r>
+            <a:endParaRPr lang="en-US" dirty="0">
+              <a:solidFill>
+                <a:schemeClr val="tx1"/>
+              </a:solidFill>
+            </a:endParaRPr>
           </a:p>
         </p:txBody>
       </p:sp>
@@ -44243,7 +43854,7 @@
         </p:nvSpPr>
         <p:spPr>
           <a:xfrm>
-            <a:off x="1281642" y="3768395"/>
+            <a:off x="1352954" y="3177670"/>
             <a:ext cx="1681922" cy="540000"/>
           </a:xfrm>
           <a:prstGeom prst="rect">
@@ -44302,7 +43913,7 @@
         </p:nvSpPr>
         <p:spPr>
           <a:xfrm>
-            <a:off x="1281642" y="2609830"/>
+            <a:off x="1352955" y="2218926"/>
             <a:ext cx="1681921" cy="540000"/>
           </a:xfrm>
           <a:prstGeom prst="rect">
@@ -44361,7 +43972,7 @@
         </p:nvSpPr>
         <p:spPr>
           <a:xfrm>
-            <a:off x="838200" y="4677150"/>
+            <a:off x="909513" y="4292102"/>
             <a:ext cx="2568804" cy="1228744"/>
           </a:xfrm>
           <a:prstGeom prst="rect">
@@ -44476,9 +44087,9 @@
           <p:nvPr/>
         </p:nvCxnSpPr>
         <p:spPr>
-          <a:xfrm>
-            <a:off x="2122603" y="3149830"/>
-            <a:ext cx="0" cy="618565"/>
+          <a:xfrm flipH="1">
+            <a:off x="2193915" y="2758926"/>
+            <a:ext cx="1" cy="418744"/>
           </a:xfrm>
           <a:prstGeom prst="straightConnector1">
             <a:avLst/>
@@ -44523,9 +44134,9 @@
           <p:nvPr/>
         </p:nvCxnSpPr>
         <p:spPr>
-          <a:xfrm flipH="1">
-            <a:off x="2122602" y="4308395"/>
-            <a:ext cx="1" cy="368755"/>
+          <a:xfrm>
+            <a:off x="2193915" y="3717670"/>
+            <a:ext cx="0" cy="574432"/>
           </a:xfrm>
           <a:prstGeom prst="straightConnector1">
             <a:avLst/>
@@ -44564,119 +44175,19 @@
           </p:cNvPr>
           <p:cNvCxnSpPr>
             <a:cxnSpLocks/>
-            <a:stCxn id="106" idx="2"/>
+            <a:stCxn id="106" idx="3"/>
             <a:endCxn id="9" idx="1"/>
           </p:cNvCxnSpPr>
           <p:nvPr/>
         </p:nvCxnSpPr>
         <p:spPr>
-          <a:xfrm rot="5400000" flipH="1" flipV="1">
-            <a:off x="2164324" y="3996673"/>
-            <a:ext cx="1867499" cy="1950944"/>
-          </a:xfrm>
-          <a:prstGeom prst="bentConnector4">
-            <a:avLst>
-              <a:gd name="adj1" fmla="val -12241"/>
-              <a:gd name="adj2" fmla="val 82917"/>
-            </a:avLst>
-          </a:prstGeom>
-          <a:ln w="28575">
-            <a:solidFill>
-              <a:schemeClr val="tx1"/>
-            </a:solidFill>
-            <a:headEnd type="none" w="med" len="med"/>
-            <a:tailEnd type="arrow" w="med" len="med"/>
-          </a:ln>
-        </p:spPr>
-        <p:style>
-          <a:lnRef idx="1">
-            <a:schemeClr val="accent1"/>
-          </a:lnRef>
-          <a:fillRef idx="0">
-            <a:schemeClr val="accent1"/>
-          </a:fillRef>
-          <a:effectRef idx="0">
-            <a:schemeClr val="accent1"/>
-          </a:effectRef>
-          <a:fontRef idx="minor">
-            <a:schemeClr val="tx1"/>
-          </a:fontRef>
-        </p:style>
-      </p:cxnSp>
-      <p:cxnSp>
-        <p:nvCxnSpPr>
-          <p:cNvPr id="116" name="Connector: Elbow 115">
-            <a:extLst>
-              <a:ext uri="{FF2B5EF4-FFF2-40B4-BE49-F238E27FC236}">
-                <a16:creationId xmlns:a16="http://schemas.microsoft.com/office/drawing/2014/main" id="{5ECC23D7-ECBF-49AF-B2B4-14CFCC5DFFB6}"/>
-              </a:ext>
-            </a:extLst>
-          </p:cNvPr>
-          <p:cNvCxnSpPr>
-            <a:cxnSpLocks/>
-            <a:stCxn id="106" idx="2"/>
-            <a:endCxn id="10" idx="2"/>
-          </p:cNvCxnSpPr>
-          <p:nvPr/>
-        </p:nvCxnSpPr>
-        <p:spPr>
-          <a:xfrm rot="5400000" flipH="1" flipV="1">
-            <a:off x="3747824" y="2683173"/>
-            <a:ext cx="1597499" cy="4847944"/>
+          <a:xfrm flipV="1">
+            <a:off x="3478317" y="3799320"/>
+            <a:ext cx="2887059" cy="1107154"/>
           </a:xfrm>
           <a:prstGeom prst="bentConnector3">
             <a:avLst>
-              <a:gd name="adj1" fmla="val -14310"/>
-            </a:avLst>
-          </a:prstGeom>
-          <a:ln w="28575">
-            <a:solidFill>
-              <a:schemeClr val="tx1"/>
-            </a:solidFill>
-            <a:headEnd type="none" w="med" len="med"/>
-            <a:tailEnd type="arrow" w="med" len="med"/>
-          </a:ln>
-        </p:spPr>
-        <p:style>
-          <a:lnRef idx="1">
-            <a:schemeClr val="accent1"/>
-          </a:lnRef>
-          <a:fillRef idx="0">
-            <a:schemeClr val="accent1"/>
-          </a:fillRef>
-          <a:effectRef idx="0">
-            <a:schemeClr val="accent1"/>
-          </a:effectRef>
-          <a:fontRef idx="minor">
-            <a:schemeClr val="tx1"/>
-          </a:fontRef>
-        </p:style>
-      </p:cxnSp>
-      <p:cxnSp>
-        <p:nvCxnSpPr>
-          <p:cNvPr id="119" name="Connector: Elbow 118">
-            <a:extLst>
-              <a:ext uri="{FF2B5EF4-FFF2-40B4-BE49-F238E27FC236}">
-                <a16:creationId xmlns:a16="http://schemas.microsoft.com/office/drawing/2014/main" id="{D6D26E1B-7B4F-4E57-9EAD-685A4A39C8BD}"/>
-              </a:ext>
-            </a:extLst>
-          </p:cNvPr>
-          <p:cNvCxnSpPr>
-            <a:cxnSpLocks/>
-            <a:stCxn id="106" idx="2"/>
-            <a:endCxn id="11" idx="1"/>
-          </p:cNvCxnSpPr>
-          <p:nvPr/>
-        </p:nvCxnSpPr>
-        <p:spPr>
-          <a:xfrm rot="5400000" flipH="1" flipV="1">
-            <a:off x="4305324" y="1855673"/>
-            <a:ext cx="1867499" cy="6232944"/>
-          </a:xfrm>
-          <a:prstGeom prst="bentConnector4">
-            <a:avLst>
-              <a:gd name="adj1" fmla="val -12241"/>
-              <a:gd name="adj2" fmla="val 93551"/>
+              <a:gd name="adj1" fmla="val 50000"/>
             </a:avLst>
           </a:prstGeom>
           <a:ln w="28575">
@@ -44716,7 +44227,7 @@
         </p:nvSpPr>
         <p:spPr>
           <a:xfrm>
-            <a:off x="4073546" y="1762759"/>
+            <a:off x="3777379" y="1569265"/>
             <a:ext cx="1512000" cy="540000"/>
           </a:xfrm>
           <a:prstGeom prst="rect">
@@ -44779,8 +44290,8 @@
         </p:nvCxnSpPr>
         <p:spPr>
           <a:xfrm>
-            <a:off x="4829546" y="2302759"/>
-            <a:ext cx="0" cy="292099"/>
+            <a:off x="4533379" y="2109265"/>
+            <a:ext cx="1" cy="262430"/>
           </a:xfrm>
           <a:prstGeom prst="straightConnector1">
             <a:avLst/>
@@ -44808,6 +44319,1892 @@
           </a:fontRef>
         </p:style>
       </p:cxnSp>
+      <p:cxnSp>
+        <p:nvCxnSpPr>
+          <p:cNvPr id="32" name="Connector: Elbow 31">
+            <a:extLst>
+              <a:ext uri="{FF2B5EF4-FFF2-40B4-BE49-F238E27FC236}">
+                <a16:creationId xmlns:a16="http://schemas.microsoft.com/office/drawing/2014/main" id="{EDA6C4E8-89FD-4B64-9E26-5A4D96D95517}"/>
+              </a:ext>
+            </a:extLst>
+          </p:cNvPr>
+          <p:cNvCxnSpPr>
+            <a:cxnSpLocks/>
+            <a:stCxn id="16" idx="3"/>
+            <a:endCxn id="45" idx="1"/>
+          </p:cNvCxnSpPr>
+          <p:nvPr/>
+        </p:nvCxnSpPr>
+        <p:spPr>
+          <a:xfrm flipV="1">
+            <a:off x="5275882" y="2641045"/>
+            <a:ext cx="791353" cy="650"/>
+          </a:xfrm>
+          <a:prstGeom prst="bentConnector3">
+            <a:avLst>
+              <a:gd name="adj1" fmla="val 50000"/>
+            </a:avLst>
+          </a:prstGeom>
+          <a:ln w="28575">
+            <a:solidFill>
+              <a:schemeClr val="tx1"/>
+            </a:solidFill>
+            <a:headEnd type="none" w="med" len="med"/>
+            <a:tailEnd type="arrow" w="med" len="med"/>
+          </a:ln>
+        </p:spPr>
+        <p:style>
+          <a:lnRef idx="1">
+            <a:schemeClr val="accent1"/>
+          </a:lnRef>
+          <a:fillRef idx="0">
+            <a:schemeClr val="accent1"/>
+          </a:fillRef>
+          <a:effectRef idx="0">
+            <a:schemeClr val="accent1"/>
+          </a:effectRef>
+          <a:fontRef idx="minor">
+            <a:schemeClr val="tx1"/>
+          </a:fontRef>
+        </p:style>
+      </p:cxnSp>
+      <p:sp>
+        <p:nvSpPr>
+          <p:cNvPr id="45" name="Rectangle 44">
+            <a:extLst>
+              <a:ext uri="{FF2B5EF4-FFF2-40B4-BE49-F238E27FC236}">
+                <a16:creationId xmlns:a16="http://schemas.microsoft.com/office/drawing/2014/main" id="{D119C033-7C55-447B-B3A3-01468B16F199}"/>
+              </a:ext>
+            </a:extLst>
+          </p:cNvPr>
+          <p:cNvSpPr/>
+          <p:nvPr/>
+        </p:nvSpPr>
+        <p:spPr>
+          <a:xfrm>
+            <a:off x="6067235" y="2371045"/>
+            <a:ext cx="2108283" cy="540000"/>
+          </a:xfrm>
+          <a:prstGeom prst="rect">
+            <a:avLst/>
+          </a:prstGeom>
+          <a:noFill/>
+          <a:ln>
+            <a:solidFill>
+              <a:schemeClr val="tx1"/>
+            </a:solidFill>
+          </a:ln>
+        </p:spPr>
+        <p:style>
+          <a:lnRef idx="2">
+            <a:schemeClr val="accent1">
+              <a:shade val="50000"/>
+            </a:schemeClr>
+          </a:lnRef>
+          <a:fillRef idx="1">
+            <a:schemeClr val="accent1"/>
+          </a:fillRef>
+          <a:effectRef idx="0">
+            <a:schemeClr val="accent1"/>
+          </a:effectRef>
+          <a:fontRef idx="minor">
+            <a:schemeClr val="lt1"/>
+          </a:fontRef>
+        </p:style>
+        <p:txBody>
+          <a:bodyPr rtlCol="0" anchor="ctr"/>
+          <a:lstStyle/>
+          <a:p>
+            <a:pPr algn="ctr"/>
+            <a:r>
+              <a:rPr lang="en-US" sz="1600" dirty="0">
+                <a:solidFill>
+                  <a:schemeClr val="tx1"/>
+                </a:solidFill>
+              </a:rPr>
+              <a:t>Execute run_search.py</a:t>
+            </a:r>
+          </a:p>
+        </p:txBody>
+      </p:sp>
+      <p:cxnSp>
+        <p:nvCxnSpPr>
+          <p:cNvPr id="56" name="Connector: Elbow 55">
+            <a:extLst>
+              <a:ext uri="{FF2B5EF4-FFF2-40B4-BE49-F238E27FC236}">
+                <a16:creationId xmlns:a16="http://schemas.microsoft.com/office/drawing/2014/main" id="{FC2BCCA9-0FEA-4187-B532-BB5EC7BEC0F2}"/>
+              </a:ext>
+            </a:extLst>
+          </p:cNvPr>
+          <p:cNvCxnSpPr>
+            <a:cxnSpLocks/>
+            <a:stCxn id="45" idx="2"/>
+            <a:endCxn id="9" idx="0"/>
+          </p:cNvCxnSpPr>
+          <p:nvPr/>
+        </p:nvCxnSpPr>
+        <p:spPr>
+          <a:xfrm rot="5400000">
+            <a:off x="6812240" y="3220182"/>
+            <a:ext cx="618275" cy="1"/>
+          </a:xfrm>
+          <a:prstGeom prst="bentConnector3">
+            <a:avLst>
+              <a:gd name="adj1" fmla="val 50000"/>
+            </a:avLst>
+          </a:prstGeom>
+          <a:ln w="28575">
+            <a:solidFill>
+              <a:schemeClr val="tx1"/>
+            </a:solidFill>
+            <a:headEnd type="none" w="med" len="med"/>
+            <a:tailEnd type="arrow" w="med" len="med"/>
+          </a:ln>
+        </p:spPr>
+        <p:style>
+          <a:lnRef idx="1">
+            <a:schemeClr val="accent1"/>
+          </a:lnRef>
+          <a:fillRef idx="0">
+            <a:schemeClr val="accent1"/>
+          </a:fillRef>
+          <a:effectRef idx="0">
+            <a:schemeClr val="accent1"/>
+          </a:effectRef>
+          <a:fontRef idx="minor">
+            <a:schemeClr val="tx1"/>
+          </a:fontRef>
+        </p:style>
+      </p:cxnSp>
+      <p:cxnSp>
+        <p:nvCxnSpPr>
+          <p:cNvPr id="84" name="Straight Arrow Connector 83">
+            <a:extLst>
+              <a:ext uri="{FF2B5EF4-FFF2-40B4-BE49-F238E27FC236}">
+                <a16:creationId xmlns:a16="http://schemas.microsoft.com/office/drawing/2014/main" id="{998DAD47-5440-4465-A839-0BD21416E568}"/>
+              </a:ext>
+            </a:extLst>
+          </p:cNvPr>
+          <p:cNvCxnSpPr>
+            <a:cxnSpLocks/>
+            <a:stCxn id="9" idx="2"/>
+            <a:endCxn id="10" idx="0"/>
+          </p:cNvCxnSpPr>
+          <p:nvPr/>
+        </p:nvCxnSpPr>
+        <p:spPr>
+          <a:xfrm>
+            <a:off x="7121376" y="4069320"/>
+            <a:ext cx="0" cy="567154"/>
+          </a:xfrm>
+          <a:prstGeom prst="straightConnector1">
+            <a:avLst/>
+          </a:prstGeom>
+          <a:ln w="28575">
+            <a:solidFill>
+              <a:schemeClr val="tx1"/>
+            </a:solidFill>
+            <a:headEnd type="none" w="med" len="med"/>
+            <a:tailEnd type="arrow" w="med" len="med"/>
+          </a:ln>
+        </p:spPr>
+        <p:style>
+          <a:lnRef idx="1">
+            <a:schemeClr val="accent1"/>
+          </a:lnRef>
+          <a:fillRef idx="0">
+            <a:schemeClr val="accent1"/>
+          </a:fillRef>
+          <a:effectRef idx="0">
+            <a:schemeClr val="accent1"/>
+          </a:effectRef>
+          <a:fontRef idx="minor">
+            <a:schemeClr val="tx1"/>
+          </a:fontRef>
+        </p:style>
+      </p:cxnSp>
+      <p:cxnSp>
+        <p:nvCxnSpPr>
+          <p:cNvPr id="135" name="Straight Arrow Connector 134">
+            <a:extLst>
+              <a:ext uri="{FF2B5EF4-FFF2-40B4-BE49-F238E27FC236}">
+                <a16:creationId xmlns:a16="http://schemas.microsoft.com/office/drawing/2014/main" id="{BE699314-0065-4C1D-8BB3-D692DB3E138B}"/>
+              </a:ext>
+            </a:extLst>
+          </p:cNvPr>
+          <p:cNvCxnSpPr>
+            <a:cxnSpLocks/>
+            <a:stCxn id="10" idx="2"/>
+            <a:endCxn id="11" idx="0"/>
+          </p:cNvCxnSpPr>
+          <p:nvPr/>
+        </p:nvCxnSpPr>
+        <p:spPr>
+          <a:xfrm>
+            <a:off x="7121376" y="5176474"/>
+            <a:ext cx="0" cy="326431"/>
+          </a:xfrm>
+          <a:prstGeom prst="straightConnector1">
+            <a:avLst/>
+          </a:prstGeom>
+          <a:ln w="28575">
+            <a:solidFill>
+              <a:schemeClr val="tx1"/>
+            </a:solidFill>
+            <a:headEnd type="none" w="med" len="med"/>
+            <a:tailEnd type="arrow" w="med" len="med"/>
+          </a:ln>
+        </p:spPr>
+        <p:style>
+          <a:lnRef idx="1">
+            <a:schemeClr val="accent1"/>
+          </a:lnRef>
+          <a:fillRef idx="0">
+            <a:schemeClr val="accent1"/>
+          </a:fillRef>
+          <a:effectRef idx="0">
+            <a:schemeClr val="accent1"/>
+          </a:effectRef>
+          <a:fontRef idx="minor">
+            <a:schemeClr val="tx1"/>
+          </a:fontRef>
+        </p:style>
+      </p:cxnSp>
+      <p:sp>
+        <p:nvSpPr>
+          <p:cNvPr id="142" name="Rectangle 141">
+            <a:extLst>
+              <a:ext uri="{FF2B5EF4-FFF2-40B4-BE49-F238E27FC236}">
+                <a16:creationId xmlns:a16="http://schemas.microsoft.com/office/drawing/2014/main" id="{7B687AE2-1FE3-4215-B4EF-E872822265D4}"/>
+              </a:ext>
+            </a:extLst>
+          </p:cNvPr>
+          <p:cNvSpPr/>
+          <p:nvPr/>
+        </p:nvSpPr>
+        <p:spPr>
+          <a:xfrm>
+            <a:off x="9215560" y="4965494"/>
+            <a:ext cx="1747080" cy="540000"/>
+          </a:xfrm>
+          <a:prstGeom prst="rect">
+            <a:avLst/>
+          </a:prstGeom>
+          <a:noFill/>
+          <a:ln>
+            <a:solidFill>
+              <a:schemeClr val="tx1"/>
+            </a:solidFill>
+          </a:ln>
+        </p:spPr>
+        <p:style>
+          <a:lnRef idx="2">
+            <a:schemeClr val="accent1">
+              <a:shade val="50000"/>
+            </a:schemeClr>
+          </a:lnRef>
+          <a:fillRef idx="1">
+            <a:schemeClr val="accent1"/>
+          </a:fillRef>
+          <a:effectRef idx="0">
+            <a:schemeClr val="accent1"/>
+          </a:effectRef>
+          <a:fontRef idx="minor">
+            <a:schemeClr val="lt1"/>
+          </a:fontRef>
+        </p:style>
+        <p:txBody>
+          <a:bodyPr rtlCol="0" anchor="ctr"/>
+          <a:lstStyle/>
+          <a:p>
+            <a:pPr algn="ctr"/>
+            <a:r>
+              <a:rPr lang="en-US" b="1" dirty="0">
+                <a:solidFill>
+                  <a:schemeClr val="tx1"/>
+                </a:solidFill>
+              </a:rPr>
+              <a:t>Candidate lists</a:t>
+            </a:r>
+          </a:p>
+        </p:txBody>
+      </p:sp>
+      <p:cxnSp>
+        <p:nvCxnSpPr>
+          <p:cNvPr id="154" name="Connector: Elbow 153">
+            <a:extLst>
+              <a:ext uri="{FF2B5EF4-FFF2-40B4-BE49-F238E27FC236}">
+                <a16:creationId xmlns:a16="http://schemas.microsoft.com/office/drawing/2014/main" id="{5253C615-5E4B-4568-84D2-01B7468C1856}"/>
+              </a:ext>
+            </a:extLst>
+          </p:cNvPr>
+          <p:cNvCxnSpPr>
+            <a:cxnSpLocks/>
+            <a:stCxn id="9" idx="3"/>
+            <a:endCxn id="142" idx="1"/>
+          </p:cNvCxnSpPr>
+          <p:nvPr/>
+        </p:nvCxnSpPr>
+        <p:spPr>
+          <a:xfrm>
+            <a:off x="7877376" y="3799320"/>
+            <a:ext cx="1338184" cy="1436174"/>
+          </a:xfrm>
+          <a:prstGeom prst="bentConnector3">
+            <a:avLst>
+              <a:gd name="adj1" fmla="val 50000"/>
+            </a:avLst>
+          </a:prstGeom>
+          <a:ln w="28575">
+            <a:solidFill>
+              <a:schemeClr val="tx1"/>
+            </a:solidFill>
+            <a:headEnd type="none" w="med" len="med"/>
+            <a:tailEnd type="arrow" w="med" len="med"/>
+          </a:ln>
+        </p:spPr>
+        <p:style>
+          <a:lnRef idx="1">
+            <a:schemeClr val="accent1"/>
+          </a:lnRef>
+          <a:fillRef idx="0">
+            <a:schemeClr val="accent1"/>
+          </a:fillRef>
+          <a:effectRef idx="0">
+            <a:schemeClr val="accent1"/>
+          </a:effectRef>
+          <a:fontRef idx="minor">
+            <a:schemeClr val="tx1"/>
+          </a:fontRef>
+        </p:style>
+      </p:cxnSp>
+      <p:sp>
+        <p:nvSpPr>
+          <p:cNvPr id="176" name="Rectangle 175">
+            <a:extLst>
+              <a:ext uri="{FF2B5EF4-FFF2-40B4-BE49-F238E27FC236}">
+                <a16:creationId xmlns:a16="http://schemas.microsoft.com/office/drawing/2014/main" id="{8D50BF5E-9A54-4548-8395-97FF5AB8EDA6}"/>
+              </a:ext>
+            </a:extLst>
+          </p:cNvPr>
+          <p:cNvSpPr/>
+          <p:nvPr/>
+        </p:nvSpPr>
+        <p:spPr>
+          <a:xfrm>
+            <a:off x="5746286" y="6209667"/>
+            <a:ext cx="1146468" cy="369332"/>
+          </a:xfrm>
+          <a:prstGeom prst="rect">
+            <a:avLst/>
+          </a:prstGeom>
+        </p:spPr>
+        <p:txBody>
+          <a:bodyPr wrap="none">
+            <a:spAutoFit/>
+          </a:bodyPr>
+          <a:lstStyle/>
+          <a:p>
+            <a:pPr algn="ctr"/>
+            <a:r>
+              <a:rPr lang="en-US" dirty="0"/>
+              <a:t>Algorithm</a:t>
+            </a:r>
+          </a:p>
+        </p:txBody>
+      </p:sp>
+      <p:cxnSp>
+        <p:nvCxnSpPr>
+          <p:cNvPr id="203" name="Straight Arrow Connector 202">
+            <a:extLst>
+              <a:ext uri="{FF2B5EF4-FFF2-40B4-BE49-F238E27FC236}">
+                <a16:creationId xmlns:a16="http://schemas.microsoft.com/office/drawing/2014/main" id="{21158D63-D68D-4807-ACE5-B12FFD36EBB0}"/>
+              </a:ext>
+            </a:extLst>
+          </p:cNvPr>
+          <p:cNvCxnSpPr>
+            <a:stCxn id="106" idx="3"/>
+            <a:endCxn id="10" idx="1"/>
+          </p:cNvCxnSpPr>
+          <p:nvPr/>
+        </p:nvCxnSpPr>
+        <p:spPr>
+          <a:xfrm>
+            <a:off x="3478317" y="4906474"/>
+            <a:ext cx="2887059" cy="0"/>
+          </a:xfrm>
+          <a:prstGeom prst="straightConnector1">
+            <a:avLst/>
+          </a:prstGeom>
+          <a:ln w="28575">
+            <a:solidFill>
+              <a:schemeClr val="tx1"/>
+            </a:solidFill>
+            <a:tailEnd type="triangle"/>
+          </a:ln>
+        </p:spPr>
+        <p:style>
+          <a:lnRef idx="1">
+            <a:schemeClr val="accent1"/>
+          </a:lnRef>
+          <a:fillRef idx="0">
+            <a:schemeClr val="accent1"/>
+          </a:fillRef>
+          <a:effectRef idx="0">
+            <a:schemeClr val="accent1"/>
+          </a:effectRef>
+          <a:fontRef idx="minor">
+            <a:schemeClr val="tx1"/>
+          </a:fontRef>
+        </p:style>
+      </p:cxnSp>
+    </p:spTree>
+    <p:extLst>
+      <p:ext uri="{BB962C8B-B14F-4D97-AF65-F5344CB8AC3E}">
+        <p14:creationId xmlns:p14="http://schemas.microsoft.com/office/powerpoint/2010/main" val="3403380133"/>
+      </p:ext>
+    </p:extLst>
+  </p:cSld>
+  <p:clrMapOvr>
+    <a:masterClrMapping/>
+  </p:clrMapOvr>
+</p:sld>
+</file>
+
+<file path=ppt/slides/slide11.xml><?xml version="1.0" encoding="utf-8"?>
+<p:sld xmlns:a="http://schemas.openxmlformats.org/drawingml/2006/main" xmlns:r="http://schemas.openxmlformats.org/officeDocument/2006/relationships" xmlns:p="http://schemas.openxmlformats.org/presentationml/2006/main">
+  <p:cSld>
+    <p:spTree>
+      <p:nvGrpSpPr>
+        <p:cNvPr id="1" name=""/>
+        <p:cNvGrpSpPr/>
+        <p:nvPr/>
+      </p:nvGrpSpPr>
+      <p:grpSpPr>
+        <a:xfrm>
+          <a:off x="0" y="0"/>
+          <a:ext cx="0" cy="0"/>
+          <a:chOff x="0" y="0"/>
+          <a:chExt cx="0" cy="0"/>
+        </a:xfrm>
+      </p:grpSpPr>
+      <p:sp>
+        <p:nvSpPr>
+          <p:cNvPr id="7" name="Title 6">
+            <a:extLst>
+              <a:ext uri="{FF2B5EF4-FFF2-40B4-BE49-F238E27FC236}">
+                <a16:creationId xmlns:a16="http://schemas.microsoft.com/office/drawing/2014/main" id="{0D1B9464-BDD8-4C66-9626-6B24609CAA8A}"/>
+              </a:ext>
+            </a:extLst>
+          </p:cNvPr>
+          <p:cNvSpPr>
+            <a:spLocks noGrp="1"/>
+          </p:cNvSpPr>
+          <p:nvPr>
+            <p:ph type="title"/>
+          </p:nvPr>
+        </p:nvSpPr>
+        <p:spPr/>
+        <p:txBody>
+          <a:bodyPr/>
+          <a:lstStyle/>
+          <a:p>
+            <a:r>
+              <a:rPr lang="en-US" dirty="0"/>
+              <a:t>Process Flow - Python</a:t>
+            </a:r>
+          </a:p>
+        </p:txBody>
+      </p:sp>
+      <p:grpSp>
+        <p:nvGrpSpPr>
+          <p:cNvPr id="3" name="Group 2">
+            <a:extLst>
+              <a:ext uri="{FF2B5EF4-FFF2-40B4-BE49-F238E27FC236}">
+                <a16:creationId xmlns:a16="http://schemas.microsoft.com/office/drawing/2014/main" id="{FD9058B8-52E3-4FBD-AF7F-77C95A2F319C}"/>
+              </a:ext>
+            </a:extLst>
+          </p:cNvPr>
+          <p:cNvGrpSpPr/>
+          <p:nvPr/>
+        </p:nvGrpSpPr>
+        <p:grpSpPr>
+          <a:xfrm>
+            <a:off x="1144929" y="1690688"/>
+            <a:ext cx="9738669" cy="4143135"/>
+            <a:chOff x="91633" y="1548628"/>
+            <a:chExt cx="9738669" cy="4143135"/>
+          </a:xfrm>
+        </p:grpSpPr>
+        <p:sp>
+          <p:nvSpPr>
+            <p:cNvPr id="9" name="Rectangle 8">
+              <a:extLst>
+                <a:ext uri="{FF2B5EF4-FFF2-40B4-BE49-F238E27FC236}">
+                  <a16:creationId xmlns:a16="http://schemas.microsoft.com/office/drawing/2014/main" id="{84775D54-E654-4909-A76E-6A5E9A8309F3}"/>
+                </a:ext>
+              </a:extLst>
+            </p:cNvPr>
+            <p:cNvSpPr/>
+            <p:nvPr/>
+          </p:nvSpPr>
+          <p:spPr>
+            <a:xfrm>
+              <a:off x="3326979" y="3554264"/>
+              <a:ext cx="1512000" cy="540000"/>
+            </a:xfrm>
+            <a:prstGeom prst="rect">
+              <a:avLst/>
+            </a:prstGeom>
+            <a:noFill/>
+            <a:ln>
+              <a:solidFill>
+                <a:schemeClr val="tx1"/>
+              </a:solidFill>
+            </a:ln>
+          </p:spPr>
+          <p:style>
+            <a:lnRef idx="2">
+              <a:schemeClr val="accent1">
+                <a:shade val="50000"/>
+              </a:schemeClr>
+            </a:lnRef>
+            <a:fillRef idx="1">
+              <a:schemeClr val="accent1"/>
+            </a:fillRef>
+            <a:effectRef idx="0">
+              <a:schemeClr val="accent1"/>
+            </a:effectRef>
+            <a:fontRef idx="minor">
+              <a:schemeClr val="lt1"/>
+            </a:fontRef>
+          </p:style>
+          <p:txBody>
+            <a:bodyPr rtlCol="0" anchor="ctr"/>
+            <a:lstStyle/>
+            <a:p>
+              <a:pPr algn="ctr"/>
+              <a:r>
+                <a:rPr lang="en-US" dirty="0" err="1">
+                  <a:solidFill>
+                    <a:schemeClr val="tx1"/>
+                  </a:solidFill>
+                </a:rPr>
+                <a:t>actor_gen</a:t>
+              </a:r>
+              <a:endParaRPr lang="en-US" dirty="0">
+                <a:solidFill>
+                  <a:schemeClr val="tx1"/>
+                </a:solidFill>
+              </a:endParaRPr>
+            </a:p>
+          </p:txBody>
+        </p:sp>
+        <p:sp>
+          <p:nvSpPr>
+            <p:cNvPr id="10" name="Rectangle 9">
+              <a:extLst>
+                <a:ext uri="{FF2B5EF4-FFF2-40B4-BE49-F238E27FC236}">
+                  <a16:creationId xmlns:a16="http://schemas.microsoft.com/office/drawing/2014/main" id="{79295E64-2271-4E1B-8F0D-59F4C0E1C667}"/>
+                </a:ext>
+              </a:extLst>
+            </p:cNvPr>
+            <p:cNvSpPr/>
+            <p:nvPr/>
+          </p:nvSpPr>
+          <p:spPr>
+            <a:xfrm>
+              <a:off x="5467979" y="3554264"/>
+              <a:ext cx="1512000" cy="540000"/>
+            </a:xfrm>
+            <a:prstGeom prst="rect">
+              <a:avLst/>
+            </a:prstGeom>
+            <a:noFill/>
+            <a:ln>
+              <a:solidFill>
+                <a:schemeClr val="tx1"/>
+              </a:solidFill>
+            </a:ln>
+          </p:spPr>
+          <p:style>
+            <a:lnRef idx="2">
+              <a:schemeClr val="accent1">
+                <a:shade val="50000"/>
+              </a:schemeClr>
+            </a:lnRef>
+            <a:fillRef idx="1">
+              <a:schemeClr val="accent1"/>
+            </a:fillRef>
+            <a:effectRef idx="0">
+              <a:schemeClr val="accent1"/>
+            </a:effectRef>
+            <a:fontRef idx="minor">
+              <a:schemeClr val="lt1"/>
+            </a:fontRef>
+          </p:style>
+          <p:txBody>
+            <a:bodyPr rtlCol="0" anchor="ctr"/>
+            <a:lstStyle/>
+            <a:p>
+              <a:pPr algn="ctr"/>
+              <a:r>
+                <a:rPr lang="en-US" dirty="0" err="1">
+                  <a:solidFill>
+                    <a:schemeClr val="tx1"/>
+                  </a:solidFill>
+                </a:rPr>
+                <a:t>actor_ranked</a:t>
+              </a:r>
+              <a:endParaRPr lang="en-US" dirty="0">
+                <a:solidFill>
+                  <a:schemeClr val="tx1"/>
+                </a:solidFill>
+              </a:endParaRPr>
+            </a:p>
+          </p:txBody>
+        </p:sp>
+        <p:sp>
+          <p:nvSpPr>
+            <p:cNvPr id="11" name="Rectangle 10">
+              <a:extLst>
+                <a:ext uri="{FF2B5EF4-FFF2-40B4-BE49-F238E27FC236}">
+                  <a16:creationId xmlns:a16="http://schemas.microsoft.com/office/drawing/2014/main" id="{C7FCE5D3-4A9A-4726-8F73-0CAF231354C7}"/>
+                </a:ext>
+              </a:extLst>
+            </p:cNvPr>
+            <p:cNvSpPr/>
+            <p:nvPr/>
+          </p:nvSpPr>
+          <p:spPr>
+            <a:xfrm>
+              <a:off x="7608979" y="3554264"/>
+              <a:ext cx="1512000" cy="540000"/>
+            </a:xfrm>
+            <a:prstGeom prst="rect">
+              <a:avLst/>
+            </a:prstGeom>
+            <a:noFill/>
+            <a:ln>
+              <a:solidFill>
+                <a:schemeClr val="tx1"/>
+              </a:solidFill>
+            </a:ln>
+          </p:spPr>
+          <p:style>
+            <a:lnRef idx="2">
+              <a:schemeClr val="accent1">
+                <a:shade val="50000"/>
+              </a:schemeClr>
+            </a:lnRef>
+            <a:fillRef idx="1">
+              <a:schemeClr val="accent1"/>
+            </a:fillRef>
+            <a:effectRef idx="0">
+              <a:schemeClr val="accent1"/>
+            </a:effectRef>
+            <a:fontRef idx="minor">
+              <a:schemeClr val="lt1"/>
+            </a:fontRef>
+          </p:style>
+          <p:txBody>
+            <a:bodyPr rtlCol="0" anchor="ctr"/>
+            <a:lstStyle/>
+            <a:p>
+              <a:pPr algn="ctr"/>
+              <a:r>
+                <a:rPr lang="en-US" dirty="0" err="1">
+                  <a:solidFill>
+                    <a:schemeClr val="tx1"/>
+                  </a:solidFill>
+                </a:rPr>
+                <a:t>relation_score</a:t>
+              </a:r>
+              <a:endParaRPr lang="en-US" dirty="0">
+                <a:solidFill>
+                  <a:schemeClr val="tx1"/>
+                </a:solidFill>
+              </a:endParaRPr>
+            </a:p>
+          </p:txBody>
+        </p:sp>
+        <p:sp>
+          <p:nvSpPr>
+            <p:cNvPr id="16" name="Rectangle 15">
+              <a:extLst>
+                <a:ext uri="{FF2B5EF4-FFF2-40B4-BE49-F238E27FC236}">
+                  <a16:creationId xmlns:a16="http://schemas.microsoft.com/office/drawing/2014/main" id="{035FD414-7F9B-44B8-AA93-609F26122989}"/>
+                </a:ext>
+              </a:extLst>
+            </p:cNvPr>
+            <p:cNvSpPr/>
+            <p:nvPr/>
+          </p:nvSpPr>
+          <p:spPr>
+            <a:xfrm>
+              <a:off x="3326979" y="2380727"/>
+              <a:ext cx="1512000" cy="540000"/>
+            </a:xfrm>
+            <a:prstGeom prst="rect">
+              <a:avLst/>
+            </a:prstGeom>
+            <a:noFill/>
+            <a:ln>
+              <a:solidFill>
+                <a:schemeClr val="tx1"/>
+              </a:solidFill>
+            </a:ln>
+          </p:spPr>
+          <p:style>
+            <a:lnRef idx="2">
+              <a:schemeClr val="accent1">
+                <a:shade val="50000"/>
+              </a:schemeClr>
+            </a:lnRef>
+            <a:fillRef idx="1">
+              <a:schemeClr val="accent1"/>
+            </a:fillRef>
+            <a:effectRef idx="0">
+              <a:schemeClr val="accent1"/>
+            </a:effectRef>
+            <a:fontRef idx="minor">
+              <a:schemeClr val="lt1"/>
+            </a:fontRef>
+          </p:style>
+          <p:txBody>
+            <a:bodyPr rtlCol="0" anchor="ctr"/>
+            <a:lstStyle/>
+            <a:p>
+              <a:pPr algn="ctr"/>
+              <a:r>
+                <a:rPr lang="en-US" sz="1600" dirty="0">
+                  <a:solidFill>
+                    <a:schemeClr val="tx1"/>
+                  </a:solidFill>
+                </a:rPr>
+                <a:t>input.txt</a:t>
+              </a:r>
+            </a:p>
+          </p:txBody>
+        </p:sp>
+        <p:sp>
+          <p:nvSpPr>
+            <p:cNvPr id="17" name="Rectangle 16">
+              <a:extLst>
+                <a:ext uri="{FF2B5EF4-FFF2-40B4-BE49-F238E27FC236}">
+                  <a16:creationId xmlns:a16="http://schemas.microsoft.com/office/drawing/2014/main" id="{537513AC-794A-494D-9A1C-5A705D0D0289}"/>
+                </a:ext>
+              </a:extLst>
+            </p:cNvPr>
+            <p:cNvSpPr/>
+            <p:nvPr/>
+          </p:nvSpPr>
+          <p:spPr>
+            <a:xfrm>
+              <a:off x="3326979" y="4747664"/>
+              <a:ext cx="1512000" cy="540000"/>
+            </a:xfrm>
+            <a:prstGeom prst="rect">
+              <a:avLst/>
+            </a:prstGeom>
+            <a:noFill/>
+            <a:ln>
+              <a:solidFill>
+                <a:schemeClr val="tx1"/>
+              </a:solidFill>
+            </a:ln>
+          </p:spPr>
+          <p:style>
+            <a:lnRef idx="2">
+              <a:schemeClr val="accent1">
+                <a:shade val="50000"/>
+              </a:schemeClr>
+            </a:lnRef>
+            <a:fillRef idx="1">
+              <a:schemeClr val="accent1"/>
+            </a:fillRef>
+            <a:effectRef idx="0">
+              <a:schemeClr val="accent1"/>
+            </a:effectRef>
+            <a:fontRef idx="minor">
+              <a:schemeClr val="lt1"/>
+            </a:fontRef>
+          </p:style>
+          <p:txBody>
+            <a:bodyPr rtlCol="0" anchor="ctr"/>
+            <a:lstStyle/>
+            <a:p>
+              <a:pPr algn="ctr"/>
+              <a:r>
+                <a:rPr lang="en-US" dirty="0">
+                  <a:solidFill>
+                    <a:schemeClr val="tx1"/>
+                  </a:solidFill>
+                </a:rPr>
+                <a:t>output.txt</a:t>
+              </a:r>
+            </a:p>
+          </p:txBody>
+        </p:sp>
+        <p:cxnSp>
+          <p:nvCxnSpPr>
+            <p:cNvPr id="19" name="Straight Arrow Connector 18">
+              <a:extLst>
+                <a:ext uri="{FF2B5EF4-FFF2-40B4-BE49-F238E27FC236}">
+                  <a16:creationId xmlns:a16="http://schemas.microsoft.com/office/drawing/2014/main" id="{6F99E1C1-7470-49C0-8081-6A3D5E511E06}"/>
+                </a:ext>
+              </a:extLst>
+            </p:cNvPr>
+            <p:cNvCxnSpPr>
+              <a:stCxn id="16" idx="2"/>
+              <a:endCxn id="9" idx="0"/>
+            </p:cNvCxnSpPr>
+            <p:nvPr/>
+          </p:nvCxnSpPr>
+          <p:spPr>
+            <a:xfrm>
+              <a:off x="4082979" y="2920727"/>
+              <a:ext cx="0" cy="633537"/>
+            </a:xfrm>
+            <a:prstGeom prst="straightConnector1">
+              <a:avLst/>
+            </a:prstGeom>
+            <a:ln w="28575">
+              <a:solidFill>
+                <a:schemeClr val="tx1"/>
+              </a:solidFill>
+              <a:headEnd type="none" w="med" len="med"/>
+              <a:tailEnd type="arrow" w="med" len="med"/>
+            </a:ln>
+          </p:spPr>
+          <p:style>
+            <a:lnRef idx="1">
+              <a:schemeClr val="accent1"/>
+            </a:lnRef>
+            <a:fillRef idx="0">
+              <a:schemeClr val="accent1"/>
+            </a:fillRef>
+            <a:effectRef idx="0">
+              <a:schemeClr val="accent1"/>
+            </a:effectRef>
+            <a:fontRef idx="minor">
+              <a:schemeClr val="tx1"/>
+            </a:fontRef>
+          </p:style>
+        </p:cxnSp>
+        <p:cxnSp>
+          <p:nvCxnSpPr>
+            <p:cNvPr id="21" name="Straight Arrow Connector 20">
+              <a:extLst>
+                <a:ext uri="{FF2B5EF4-FFF2-40B4-BE49-F238E27FC236}">
+                  <a16:creationId xmlns:a16="http://schemas.microsoft.com/office/drawing/2014/main" id="{2FDD322F-E586-4FA6-A930-FD64E2C38C87}"/>
+                </a:ext>
+              </a:extLst>
+            </p:cNvPr>
+            <p:cNvCxnSpPr>
+              <a:cxnSpLocks/>
+              <a:stCxn id="9" idx="2"/>
+              <a:endCxn id="17" idx="0"/>
+            </p:cNvCxnSpPr>
+            <p:nvPr/>
+          </p:nvCxnSpPr>
+          <p:spPr>
+            <a:xfrm>
+              <a:off x="4082979" y="4094264"/>
+              <a:ext cx="0" cy="653400"/>
+            </a:xfrm>
+            <a:prstGeom prst="straightConnector1">
+              <a:avLst/>
+            </a:prstGeom>
+            <a:ln w="28575">
+              <a:solidFill>
+                <a:schemeClr val="tx1"/>
+              </a:solidFill>
+              <a:headEnd type="none" w="med" len="med"/>
+              <a:tailEnd type="arrow" w="med" len="med"/>
+            </a:ln>
+          </p:spPr>
+          <p:style>
+            <a:lnRef idx="1">
+              <a:schemeClr val="accent1"/>
+            </a:lnRef>
+            <a:fillRef idx="0">
+              <a:schemeClr val="accent1"/>
+            </a:fillRef>
+            <a:effectRef idx="0">
+              <a:schemeClr val="accent1"/>
+            </a:effectRef>
+            <a:fontRef idx="minor">
+              <a:schemeClr val="tx1"/>
+            </a:fontRef>
+          </p:style>
+        </p:cxnSp>
+        <p:cxnSp>
+          <p:nvCxnSpPr>
+            <p:cNvPr id="23" name="Connector: Elbow 22">
+              <a:extLst>
+                <a:ext uri="{FF2B5EF4-FFF2-40B4-BE49-F238E27FC236}">
+                  <a16:creationId xmlns:a16="http://schemas.microsoft.com/office/drawing/2014/main" id="{BB5D08B3-2A4A-4191-9408-1E2BA7D18992}"/>
+                </a:ext>
+              </a:extLst>
+            </p:cNvPr>
+            <p:cNvCxnSpPr>
+              <a:cxnSpLocks/>
+              <a:stCxn id="17" idx="2"/>
+              <a:endCxn id="10" idx="1"/>
+            </p:cNvCxnSpPr>
+            <p:nvPr/>
+          </p:nvCxnSpPr>
+          <p:spPr>
+            <a:xfrm rot="5400000" flipH="1" flipV="1">
+              <a:off x="4043779" y="3863464"/>
+              <a:ext cx="1463400" cy="1385000"/>
+            </a:xfrm>
+            <a:prstGeom prst="bentConnector4">
+              <a:avLst>
+                <a:gd name="adj1" fmla="val -15621"/>
+                <a:gd name="adj2" fmla="val 77292"/>
+              </a:avLst>
+            </a:prstGeom>
+            <a:ln w="28575">
+              <a:solidFill>
+                <a:schemeClr val="tx1"/>
+              </a:solidFill>
+              <a:headEnd type="none" w="med" len="med"/>
+              <a:tailEnd type="arrow" w="med" len="med"/>
+            </a:ln>
+          </p:spPr>
+          <p:style>
+            <a:lnRef idx="1">
+              <a:schemeClr val="accent1"/>
+            </a:lnRef>
+            <a:fillRef idx="0">
+              <a:schemeClr val="accent1"/>
+            </a:fillRef>
+            <a:effectRef idx="0">
+              <a:schemeClr val="accent1"/>
+            </a:effectRef>
+            <a:fontRef idx="minor">
+              <a:schemeClr val="tx1"/>
+            </a:fontRef>
+          </p:style>
+        </p:cxnSp>
+        <p:sp>
+          <p:nvSpPr>
+            <p:cNvPr id="31" name="Rectangle 30">
+              <a:extLst>
+                <a:ext uri="{FF2B5EF4-FFF2-40B4-BE49-F238E27FC236}">
+                  <a16:creationId xmlns:a16="http://schemas.microsoft.com/office/drawing/2014/main" id="{6C995979-964E-4BA7-AD25-39A92CD52E80}"/>
+                </a:ext>
+              </a:extLst>
+            </p:cNvPr>
+            <p:cNvSpPr/>
+            <p:nvPr/>
+          </p:nvSpPr>
+          <p:spPr>
+            <a:xfrm>
+              <a:off x="5467979" y="2380727"/>
+              <a:ext cx="1512000" cy="540000"/>
+            </a:xfrm>
+            <a:prstGeom prst="rect">
+              <a:avLst/>
+            </a:prstGeom>
+            <a:noFill/>
+            <a:ln>
+              <a:solidFill>
+                <a:schemeClr val="tx1"/>
+              </a:solidFill>
+            </a:ln>
+          </p:spPr>
+          <p:style>
+            <a:lnRef idx="2">
+              <a:schemeClr val="accent1">
+                <a:shade val="50000"/>
+              </a:schemeClr>
+            </a:lnRef>
+            <a:fillRef idx="1">
+              <a:schemeClr val="accent1"/>
+            </a:fillRef>
+            <a:effectRef idx="0">
+              <a:schemeClr val="accent1"/>
+            </a:effectRef>
+            <a:fontRef idx="minor">
+              <a:schemeClr val="lt1"/>
+            </a:fontRef>
+          </p:style>
+          <p:txBody>
+            <a:bodyPr rtlCol="0" anchor="ctr"/>
+            <a:lstStyle/>
+            <a:p>
+              <a:pPr algn="ctr"/>
+              <a:r>
+                <a:rPr lang="en-US" sz="1600" dirty="0">
+                  <a:solidFill>
+                    <a:schemeClr val="tx1"/>
+                  </a:solidFill>
+                </a:rPr>
+                <a:t>{}_</a:t>
+              </a:r>
+              <a:r>
+                <a:rPr lang="en-US" sz="1600" dirty="0" err="1">
+                  <a:solidFill>
+                    <a:schemeClr val="tx1"/>
+                  </a:solidFill>
+                </a:rPr>
+                <a:t>actor.tsv</a:t>
+              </a:r>
+              <a:endParaRPr lang="en-US" sz="1600" dirty="0">
+                <a:solidFill>
+                  <a:schemeClr val="tx1"/>
+                </a:solidFill>
+              </a:endParaRPr>
+            </a:p>
+          </p:txBody>
+        </p:sp>
+        <p:cxnSp>
+          <p:nvCxnSpPr>
+            <p:cNvPr id="33" name="Straight Arrow Connector 32">
+              <a:extLst>
+                <a:ext uri="{FF2B5EF4-FFF2-40B4-BE49-F238E27FC236}">
+                  <a16:creationId xmlns:a16="http://schemas.microsoft.com/office/drawing/2014/main" id="{8F9C4C29-03FC-4CB7-A3E2-EA043F212104}"/>
+                </a:ext>
+              </a:extLst>
+            </p:cNvPr>
+            <p:cNvCxnSpPr>
+              <a:stCxn id="10" idx="0"/>
+              <a:endCxn id="31" idx="2"/>
+            </p:cNvCxnSpPr>
+            <p:nvPr/>
+          </p:nvCxnSpPr>
+          <p:spPr>
+            <a:xfrm flipV="1">
+              <a:off x="6223979" y="2920727"/>
+              <a:ext cx="0" cy="633537"/>
+            </a:xfrm>
+            <a:prstGeom prst="straightConnector1">
+              <a:avLst/>
+            </a:prstGeom>
+            <a:ln w="28575">
+              <a:solidFill>
+                <a:schemeClr val="tx1"/>
+              </a:solidFill>
+              <a:headEnd type="none" w="med" len="med"/>
+              <a:tailEnd type="arrow" w="med" len="med"/>
+            </a:ln>
+          </p:spPr>
+          <p:style>
+            <a:lnRef idx="1">
+              <a:schemeClr val="accent1"/>
+            </a:lnRef>
+            <a:fillRef idx="0">
+              <a:schemeClr val="accent1"/>
+            </a:fillRef>
+            <a:effectRef idx="0">
+              <a:schemeClr val="accent1"/>
+            </a:effectRef>
+            <a:fontRef idx="minor">
+              <a:schemeClr val="tx1"/>
+            </a:fontRef>
+          </p:style>
+        </p:cxnSp>
+        <p:cxnSp>
+          <p:nvCxnSpPr>
+            <p:cNvPr id="39" name="Connector: Elbow 38">
+              <a:extLst>
+                <a:ext uri="{FF2B5EF4-FFF2-40B4-BE49-F238E27FC236}">
+                  <a16:creationId xmlns:a16="http://schemas.microsoft.com/office/drawing/2014/main" id="{A9812A3D-335F-4213-BA11-C3715AFCFC69}"/>
+                </a:ext>
+              </a:extLst>
+            </p:cNvPr>
+            <p:cNvCxnSpPr>
+              <a:cxnSpLocks/>
+              <a:stCxn id="31" idx="3"/>
+              <a:endCxn id="11" idx="0"/>
+            </p:cNvCxnSpPr>
+            <p:nvPr/>
+          </p:nvCxnSpPr>
+          <p:spPr>
+            <a:xfrm>
+              <a:off x="6979979" y="2650727"/>
+              <a:ext cx="1385000" cy="903537"/>
+            </a:xfrm>
+            <a:prstGeom prst="bentConnector2">
+              <a:avLst/>
+            </a:prstGeom>
+            <a:ln w="28575">
+              <a:solidFill>
+                <a:schemeClr val="tx1"/>
+              </a:solidFill>
+              <a:headEnd type="none" w="med" len="med"/>
+              <a:tailEnd type="arrow" w="med" len="med"/>
+            </a:ln>
+          </p:spPr>
+          <p:style>
+            <a:lnRef idx="1">
+              <a:schemeClr val="accent1"/>
+            </a:lnRef>
+            <a:fillRef idx="0">
+              <a:schemeClr val="accent1"/>
+            </a:fillRef>
+            <a:effectRef idx="0">
+              <a:schemeClr val="accent1"/>
+            </a:effectRef>
+            <a:fontRef idx="minor">
+              <a:schemeClr val="tx1"/>
+            </a:fontRef>
+          </p:style>
+        </p:cxnSp>
+        <p:sp>
+          <p:nvSpPr>
+            <p:cNvPr id="44" name="Rectangle 43">
+              <a:extLst>
+                <a:ext uri="{FF2B5EF4-FFF2-40B4-BE49-F238E27FC236}">
+                  <a16:creationId xmlns:a16="http://schemas.microsoft.com/office/drawing/2014/main" id="{878DAF90-F1FD-4BDF-B8C9-CE55FDCA3EEF}"/>
+                </a:ext>
+              </a:extLst>
+            </p:cNvPr>
+            <p:cNvSpPr/>
+            <p:nvPr/>
+          </p:nvSpPr>
+          <p:spPr>
+            <a:xfrm>
+              <a:off x="7608977" y="4747664"/>
+              <a:ext cx="1512000" cy="540000"/>
+            </a:xfrm>
+            <a:prstGeom prst="rect">
+              <a:avLst/>
+            </a:prstGeom>
+            <a:noFill/>
+            <a:ln>
+              <a:solidFill>
+                <a:schemeClr val="tx1"/>
+              </a:solidFill>
+            </a:ln>
+          </p:spPr>
+          <p:style>
+            <a:lnRef idx="2">
+              <a:schemeClr val="accent1">
+                <a:shade val="50000"/>
+              </a:schemeClr>
+            </a:lnRef>
+            <a:fillRef idx="1">
+              <a:schemeClr val="accent1"/>
+            </a:fillRef>
+            <a:effectRef idx="0">
+              <a:schemeClr val="accent1"/>
+            </a:effectRef>
+            <a:fontRef idx="minor">
+              <a:schemeClr val="lt1"/>
+            </a:fontRef>
+          </p:style>
+          <p:txBody>
+            <a:bodyPr rtlCol="0" anchor="ctr"/>
+            <a:lstStyle/>
+            <a:p>
+              <a:pPr algn="ctr"/>
+              <a:r>
+                <a:rPr lang="en-US" b="1" dirty="0" err="1">
+                  <a:solidFill>
+                    <a:schemeClr val="tx1"/>
+                  </a:solidFill>
+                </a:rPr>
+                <a:t>final.tsv</a:t>
+              </a:r>
+              <a:endParaRPr lang="en-US" b="1" dirty="0">
+                <a:solidFill>
+                  <a:schemeClr val="tx1"/>
+                </a:solidFill>
+              </a:endParaRPr>
+            </a:p>
+          </p:txBody>
+        </p:sp>
+        <p:cxnSp>
+          <p:nvCxnSpPr>
+            <p:cNvPr id="46" name="Straight Arrow Connector 45">
+              <a:extLst>
+                <a:ext uri="{FF2B5EF4-FFF2-40B4-BE49-F238E27FC236}">
+                  <a16:creationId xmlns:a16="http://schemas.microsoft.com/office/drawing/2014/main" id="{ED255493-157F-4B20-8F7F-C969F0A1DE2E}"/>
+                </a:ext>
+              </a:extLst>
+            </p:cNvPr>
+            <p:cNvCxnSpPr>
+              <a:cxnSpLocks/>
+              <a:stCxn id="11" idx="2"/>
+              <a:endCxn id="44" idx="0"/>
+            </p:cNvCxnSpPr>
+            <p:nvPr/>
+          </p:nvCxnSpPr>
+          <p:spPr>
+            <a:xfrm flipH="1">
+              <a:off x="8364977" y="4094264"/>
+              <a:ext cx="2" cy="653400"/>
+            </a:xfrm>
+            <a:prstGeom prst="straightConnector1">
+              <a:avLst/>
+            </a:prstGeom>
+            <a:ln w="28575">
+              <a:solidFill>
+                <a:schemeClr val="tx1"/>
+              </a:solidFill>
+              <a:headEnd type="none" w="med" len="med"/>
+              <a:tailEnd type="arrow" w="med" len="med"/>
+            </a:ln>
+          </p:spPr>
+          <p:style>
+            <a:lnRef idx="1">
+              <a:schemeClr val="accent1"/>
+            </a:lnRef>
+            <a:fillRef idx="0">
+              <a:schemeClr val="accent1"/>
+            </a:fillRef>
+            <a:effectRef idx="0">
+              <a:schemeClr val="accent1"/>
+            </a:effectRef>
+            <a:fontRef idx="minor">
+              <a:schemeClr val="tx1"/>
+            </a:fontRef>
+          </p:style>
+        </p:cxnSp>
+        <p:sp>
+          <p:nvSpPr>
+            <p:cNvPr id="90" name="Rectangle 89">
+              <a:extLst>
+                <a:ext uri="{FF2B5EF4-FFF2-40B4-BE49-F238E27FC236}">
+                  <a16:creationId xmlns:a16="http://schemas.microsoft.com/office/drawing/2014/main" id="{705E0A64-783C-4A55-AA9F-8AB1EB3C8EBE}"/>
+                </a:ext>
+              </a:extLst>
+            </p:cNvPr>
+            <p:cNvSpPr/>
+            <p:nvPr/>
+          </p:nvSpPr>
+          <p:spPr>
+            <a:xfrm>
+              <a:off x="2822189" y="3268502"/>
+              <a:ext cx="7008113" cy="1152462"/>
+            </a:xfrm>
+            <a:prstGeom prst="rect">
+              <a:avLst/>
+            </a:prstGeom>
+            <a:noFill/>
+            <a:ln>
+              <a:solidFill>
+                <a:schemeClr val="tx1"/>
+              </a:solidFill>
+              <a:prstDash val="dash"/>
+            </a:ln>
+          </p:spPr>
+          <p:style>
+            <a:lnRef idx="2">
+              <a:schemeClr val="accent1">
+                <a:shade val="50000"/>
+              </a:schemeClr>
+            </a:lnRef>
+            <a:fillRef idx="1">
+              <a:schemeClr val="accent1"/>
+            </a:fillRef>
+            <a:effectRef idx="0">
+              <a:schemeClr val="accent1"/>
+            </a:effectRef>
+            <a:fontRef idx="minor">
+              <a:schemeClr val="lt1"/>
+            </a:fontRef>
+          </p:style>
+          <p:txBody>
+            <a:bodyPr vert="vert270" rtlCol="0" anchor="b"/>
+            <a:lstStyle/>
+            <a:p>
+              <a:pPr algn="ctr"/>
+              <a:r>
+                <a:rPr lang="en-US" dirty="0">
+                  <a:solidFill>
+                    <a:schemeClr val="tx1"/>
+                  </a:solidFill>
+                </a:rPr>
+                <a:t>Algorithms</a:t>
+              </a:r>
+            </a:p>
+          </p:txBody>
+        </p:sp>
+        <p:sp>
+          <p:nvSpPr>
+            <p:cNvPr id="103" name="Rectangle 102">
+              <a:extLst>
+                <a:ext uri="{FF2B5EF4-FFF2-40B4-BE49-F238E27FC236}">
+                  <a16:creationId xmlns:a16="http://schemas.microsoft.com/office/drawing/2014/main" id="{F66A87F0-6AC8-4962-A7B2-4E9D305B0C21}"/>
+                </a:ext>
+              </a:extLst>
+            </p:cNvPr>
+            <p:cNvSpPr/>
+            <p:nvPr/>
+          </p:nvSpPr>
+          <p:spPr>
+            <a:xfrm>
+              <a:off x="535075" y="3554264"/>
+              <a:ext cx="1681922" cy="540000"/>
+            </a:xfrm>
+            <a:prstGeom prst="rect">
+              <a:avLst/>
+            </a:prstGeom>
+            <a:noFill/>
+            <a:ln>
+              <a:solidFill>
+                <a:schemeClr val="tx1"/>
+              </a:solidFill>
+            </a:ln>
+          </p:spPr>
+          <p:style>
+            <a:lnRef idx="2">
+              <a:schemeClr val="accent1">
+                <a:shade val="50000"/>
+              </a:schemeClr>
+            </a:lnRef>
+            <a:fillRef idx="1">
+              <a:schemeClr val="accent1"/>
+            </a:fillRef>
+            <a:effectRef idx="0">
+              <a:schemeClr val="accent1"/>
+            </a:effectRef>
+            <a:fontRef idx="minor">
+              <a:schemeClr val="lt1"/>
+            </a:fontRef>
+          </p:style>
+          <p:txBody>
+            <a:bodyPr rtlCol="0" anchor="ctr"/>
+            <a:lstStyle/>
+            <a:p>
+              <a:pPr algn="ctr"/>
+              <a:r>
+                <a:rPr lang="en-US" dirty="0">
+                  <a:solidFill>
+                    <a:schemeClr val="tx1"/>
+                  </a:solidFill>
+                </a:rPr>
+                <a:t>Pre-processing</a:t>
+              </a:r>
+            </a:p>
+          </p:txBody>
+        </p:sp>
+        <p:sp>
+          <p:nvSpPr>
+            <p:cNvPr id="105" name="Rectangle 104">
+              <a:extLst>
+                <a:ext uri="{FF2B5EF4-FFF2-40B4-BE49-F238E27FC236}">
+                  <a16:creationId xmlns:a16="http://schemas.microsoft.com/office/drawing/2014/main" id="{188EB883-D483-4EB0-826D-D584F631FFAD}"/>
+                </a:ext>
+              </a:extLst>
+            </p:cNvPr>
+            <p:cNvSpPr/>
+            <p:nvPr/>
+          </p:nvSpPr>
+          <p:spPr>
+            <a:xfrm>
+              <a:off x="535075" y="2395699"/>
+              <a:ext cx="1681921" cy="540000"/>
+            </a:xfrm>
+            <a:prstGeom prst="rect">
+              <a:avLst/>
+            </a:prstGeom>
+            <a:noFill/>
+            <a:ln>
+              <a:solidFill>
+                <a:schemeClr val="tx1"/>
+              </a:solidFill>
+            </a:ln>
+          </p:spPr>
+          <p:style>
+            <a:lnRef idx="2">
+              <a:schemeClr val="accent1">
+                <a:shade val="50000"/>
+              </a:schemeClr>
+            </a:lnRef>
+            <a:fillRef idx="1">
+              <a:schemeClr val="accent1"/>
+            </a:fillRef>
+            <a:effectRef idx="0">
+              <a:schemeClr val="accent1"/>
+            </a:effectRef>
+            <a:fontRef idx="minor">
+              <a:schemeClr val="lt1"/>
+            </a:fontRef>
+          </p:style>
+          <p:txBody>
+            <a:bodyPr rtlCol="0" anchor="ctr"/>
+            <a:lstStyle/>
+            <a:p>
+              <a:pPr algn="ctr"/>
+              <a:r>
+                <a:rPr lang="en-US" sz="1600" dirty="0">
+                  <a:solidFill>
+                    <a:schemeClr val="tx1"/>
+                  </a:solidFill>
+                </a:rPr>
+                <a:t>IMDB Dataset</a:t>
+              </a:r>
+            </a:p>
+          </p:txBody>
+        </p:sp>
+        <p:sp>
+          <p:nvSpPr>
+            <p:cNvPr id="106" name="Rectangle 105">
+              <a:extLst>
+                <a:ext uri="{FF2B5EF4-FFF2-40B4-BE49-F238E27FC236}">
+                  <a16:creationId xmlns:a16="http://schemas.microsoft.com/office/drawing/2014/main" id="{DA678A5D-5D31-4823-A960-CB27F2520411}"/>
+                </a:ext>
+              </a:extLst>
+            </p:cNvPr>
+            <p:cNvSpPr/>
+            <p:nvPr/>
+          </p:nvSpPr>
+          <p:spPr>
+            <a:xfrm>
+              <a:off x="91633" y="4463019"/>
+              <a:ext cx="2568804" cy="1228744"/>
+            </a:xfrm>
+            <a:prstGeom prst="rect">
+              <a:avLst/>
+            </a:prstGeom>
+            <a:noFill/>
+            <a:ln>
+              <a:solidFill>
+                <a:schemeClr val="tx1"/>
+              </a:solidFill>
+            </a:ln>
+          </p:spPr>
+          <p:style>
+            <a:lnRef idx="2">
+              <a:schemeClr val="accent1">
+                <a:shade val="50000"/>
+              </a:schemeClr>
+            </a:lnRef>
+            <a:fillRef idx="1">
+              <a:schemeClr val="accent1"/>
+            </a:fillRef>
+            <a:effectRef idx="0">
+              <a:schemeClr val="accent1"/>
+            </a:effectRef>
+            <a:fontRef idx="minor">
+              <a:schemeClr val="lt1"/>
+            </a:fontRef>
+          </p:style>
+          <p:txBody>
+            <a:bodyPr rtlCol="0" anchor="ctr"/>
+            <a:lstStyle/>
+            <a:p>
+              <a:pPr algn="ctr"/>
+              <a:r>
+                <a:rPr lang="en-US" dirty="0" err="1">
+                  <a:solidFill>
+                    <a:schemeClr val="tx1"/>
+                  </a:solidFill>
+                </a:rPr>
+                <a:t>name.tsv</a:t>
+              </a:r>
+              <a:endParaRPr lang="en-US" dirty="0">
+                <a:solidFill>
+                  <a:schemeClr val="tx1"/>
+                </a:solidFill>
+              </a:endParaRPr>
+            </a:p>
+            <a:p>
+              <a:pPr algn="ctr"/>
+              <a:r>
+                <a:rPr lang="en-US" dirty="0" err="1">
+                  <a:solidFill>
+                    <a:schemeClr val="tx1"/>
+                  </a:solidFill>
+                </a:rPr>
+                <a:t>genre_scores.tsv</a:t>
+              </a:r>
+              <a:endParaRPr lang="en-US" dirty="0">
+                <a:solidFill>
+                  <a:schemeClr val="tx1"/>
+                </a:solidFill>
+              </a:endParaRPr>
+            </a:p>
+            <a:p>
+              <a:pPr algn="ctr"/>
+              <a:r>
+                <a:rPr lang="en-US" dirty="0" err="1">
+                  <a:solidFill>
+                    <a:schemeClr val="tx1"/>
+                  </a:solidFill>
+                </a:rPr>
+                <a:t>principals.tsv</a:t>
+              </a:r>
+              <a:endParaRPr lang="en-US" dirty="0">
+                <a:solidFill>
+                  <a:schemeClr val="tx1"/>
+                </a:solidFill>
+              </a:endParaRPr>
+            </a:p>
+            <a:p>
+              <a:pPr algn="ctr"/>
+              <a:r>
+                <a:rPr lang="en-US" dirty="0" err="1">
+                  <a:solidFill>
+                    <a:schemeClr val="tx1"/>
+                  </a:solidFill>
+                </a:rPr>
+                <a:t>summary_box_office.tsv</a:t>
+              </a:r>
+              <a:endParaRPr lang="en-US" dirty="0">
+                <a:solidFill>
+                  <a:schemeClr val="tx1"/>
+                </a:solidFill>
+              </a:endParaRPr>
+            </a:p>
+          </p:txBody>
+        </p:sp>
+        <p:cxnSp>
+          <p:nvCxnSpPr>
+            <p:cNvPr id="107" name="Straight Arrow Connector 106">
+              <a:extLst>
+                <a:ext uri="{FF2B5EF4-FFF2-40B4-BE49-F238E27FC236}">
+                  <a16:creationId xmlns:a16="http://schemas.microsoft.com/office/drawing/2014/main" id="{73737D91-7B3A-43E6-B791-6FC6C252E241}"/>
+                </a:ext>
+              </a:extLst>
+            </p:cNvPr>
+            <p:cNvCxnSpPr>
+              <a:cxnSpLocks/>
+              <a:stCxn id="105" idx="2"/>
+              <a:endCxn id="103" idx="0"/>
+            </p:cNvCxnSpPr>
+            <p:nvPr/>
+          </p:nvCxnSpPr>
+          <p:spPr>
+            <a:xfrm>
+              <a:off x="1376036" y="2935699"/>
+              <a:ext cx="0" cy="618565"/>
+            </a:xfrm>
+            <a:prstGeom prst="straightConnector1">
+              <a:avLst/>
+            </a:prstGeom>
+            <a:ln w="28575">
+              <a:solidFill>
+                <a:schemeClr val="tx1"/>
+              </a:solidFill>
+              <a:headEnd type="none" w="med" len="med"/>
+              <a:tailEnd type="arrow" w="med" len="med"/>
+            </a:ln>
+          </p:spPr>
+          <p:style>
+            <a:lnRef idx="1">
+              <a:schemeClr val="accent1"/>
+            </a:lnRef>
+            <a:fillRef idx="0">
+              <a:schemeClr val="accent1"/>
+            </a:fillRef>
+            <a:effectRef idx="0">
+              <a:schemeClr val="accent1"/>
+            </a:effectRef>
+            <a:fontRef idx="minor">
+              <a:schemeClr val="tx1"/>
+            </a:fontRef>
+          </p:style>
+        </p:cxnSp>
+        <p:cxnSp>
+          <p:nvCxnSpPr>
+            <p:cNvPr id="110" name="Straight Arrow Connector 109">
+              <a:extLst>
+                <a:ext uri="{FF2B5EF4-FFF2-40B4-BE49-F238E27FC236}">
+                  <a16:creationId xmlns:a16="http://schemas.microsoft.com/office/drawing/2014/main" id="{17DE054A-7C06-41E1-A636-2BBC300D9370}"/>
+                </a:ext>
+              </a:extLst>
+            </p:cNvPr>
+            <p:cNvCxnSpPr>
+              <a:cxnSpLocks/>
+              <a:stCxn id="103" idx="2"/>
+              <a:endCxn id="106" idx="0"/>
+            </p:cNvCxnSpPr>
+            <p:nvPr/>
+          </p:nvCxnSpPr>
+          <p:spPr>
+            <a:xfrm flipH="1">
+              <a:off x="1376035" y="4094264"/>
+              <a:ext cx="1" cy="368755"/>
+            </a:xfrm>
+            <a:prstGeom prst="straightConnector1">
+              <a:avLst/>
+            </a:prstGeom>
+            <a:ln w="28575">
+              <a:solidFill>
+                <a:schemeClr val="tx1"/>
+              </a:solidFill>
+              <a:headEnd type="none" w="med" len="med"/>
+              <a:tailEnd type="arrow" w="med" len="med"/>
+            </a:ln>
+          </p:spPr>
+          <p:style>
+            <a:lnRef idx="1">
+              <a:schemeClr val="accent1"/>
+            </a:lnRef>
+            <a:fillRef idx="0">
+              <a:schemeClr val="accent1"/>
+            </a:fillRef>
+            <a:effectRef idx="0">
+              <a:schemeClr val="accent1"/>
+            </a:effectRef>
+            <a:fontRef idx="minor">
+              <a:schemeClr val="tx1"/>
+            </a:fontRef>
+          </p:style>
+        </p:cxnSp>
+        <p:cxnSp>
+          <p:nvCxnSpPr>
+            <p:cNvPr id="113" name="Connector: Elbow 112">
+              <a:extLst>
+                <a:ext uri="{FF2B5EF4-FFF2-40B4-BE49-F238E27FC236}">
+                  <a16:creationId xmlns:a16="http://schemas.microsoft.com/office/drawing/2014/main" id="{5D241EC1-EFB9-491B-9497-37268E02D45E}"/>
+                </a:ext>
+              </a:extLst>
+            </p:cNvPr>
+            <p:cNvCxnSpPr>
+              <a:cxnSpLocks/>
+              <a:stCxn id="106" idx="2"/>
+              <a:endCxn id="9" idx="1"/>
+            </p:cNvCxnSpPr>
+            <p:nvPr/>
+          </p:nvCxnSpPr>
+          <p:spPr>
+            <a:xfrm rot="5400000" flipH="1" flipV="1">
+              <a:off x="1417757" y="3782542"/>
+              <a:ext cx="1867499" cy="1950944"/>
+            </a:xfrm>
+            <a:prstGeom prst="bentConnector4">
+              <a:avLst>
+                <a:gd name="adj1" fmla="val -12241"/>
+                <a:gd name="adj2" fmla="val 82917"/>
+              </a:avLst>
+            </a:prstGeom>
+            <a:ln w="28575">
+              <a:solidFill>
+                <a:schemeClr val="tx1"/>
+              </a:solidFill>
+              <a:headEnd type="none" w="med" len="med"/>
+              <a:tailEnd type="arrow" w="med" len="med"/>
+            </a:ln>
+          </p:spPr>
+          <p:style>
+            <a:lnRef idx="1">
+              <a:schemeClr val="accent1"/>
+            </a:lnRef>
+            <a:fillRef idx="0">
+              <a:schemeClr val="accent1"/>
+            </a:fillRef>
+            <a:effectRef idx="0">
+              <a:schemeClr val="accent1"/>
+            </a:effectRef>
+            <a:fontRef idx="minor">
+              <a:schemeClr val="tx1"/>
+            </a:fontRef>
+          </p:style>
+        </p:cxnSp>
+        <p:cxnSp>
+          <p:nvCxnSpPr>
+            <p:cNvPr id="116" name="Connector: Elbow 115">
+              <a:extLst>
+                <a:ext uri="{FF2B5EF4-FFF2-40B4-BE49-F238E27FC236}">
+                  <a16:creationId xmlns:a16="http://schemas.microsoft.com/office/drawing/2014/main" id="{5ECC23D7-ECBF-49AF-B2B4-14CFCC5DFFB6}"/>
+                </a:ext>
+              </a:extLst>
+            </p:cNvPr>
+            <p:cNvCxnSpPr>
+              <a:cxnSpLocks/>
+              <a:stCxn id="106" idx="2"/>
+              <a:endCxn id="10" idx="2"/>
+            </p:cNvCxnSpPr>
+            <p:nvPr/>
+          </p:nvCxnSpPr>
+          <p:spPr>
+            <a:xfrm rot="5400000" flipH="1" flipV="1">
+              <a:off x="3001257" y="2469042"/>
+              <a:ext cx="1597499" cy="4847944"/>
+            </a:xfrm>
+            <a:prstGeom prst="bentConnector3">
+              <a:avLst>
+                <a:gd name="adj1" fmla="val -14310"/>
+              </a:avLst>
+            </a:prstGeom>
+            <a:ln w="28575">
+              <a:solidFill>
+                <a:schemeClr val="tx1"/>
+              </a:solidFill>
+              <a:headEnd type="none" w="med" len="med"/>
+              <a:tailEnd type="arrow" w="med" len="med"/>
+            </a:ln>
+          </p:spPr>
+          <p:style>
+            <a:lnRef idx="1">
+              <a:schemeClr val="accent1"/>
+            </a:lnRef>
+            <a:fillRef idx="0">
+              <a:schemeClr val="accent1"/>
+            </a:fillRef>
+            <a:effectRef idx="0">
+              <a:schemeClr val="accent1"/>
+            </a:effectRef>
+            <a:fontRef idx="minor">
+              <a:schemeClr val="tx1"/>
+            </a:fontRef>
+          </p:style>
+        </p:cxnSp>
+        <p:cxnSp>
+          <p:nvCxnSpPr>
+            <p:cNvPr id="119" name="Connector: Elbow 118">
+              <a:extLst>
+                <a:ext uri="{FF2B5EF4-FFF2-40B4-BE49-F238E27FC236}">
+                  <a16:creationId xmlns:a16="http://schemas.microsoft.com/office/drawing/2014/main" id="{D6D26E1B-7B4F-4E57-9EAD-685A4A39C8BD}"/>
+                </a:ext>
+              </a:extLst>
+            </p:cNvPr>
+            <p:cNvCxnSpPr>
+              <a:cxnSpLocks/>
+              <a:stCxn id="106" idx="2"/>
+              <a:endCxn id="11" idx="1"/>
+            </p:cNvCxnSpPr>
+            <p:nvPr/>
+          </p:nvCxnSpPr>
+          <p:spPr>
+            <a:xfrm rot="5400000" flipH="1" flipV="1">
+              <a:off x="3558757" y="1641542"/>
+              <a:ext cx="1867499" cy="6232944"/>
+            </a:xfrm>
+            <a:prstGeom prst="bentConnector4">
+              <a:avLst>
+                <a:gd name="adj1" fmla="val -12241"/>
+                <a:gd name="adj2" fmla="val 93551"/>
+              </a:avLst>
+            </a:prstGeom>
+            <a:ln w="28575">
+              <a:solidFill>
+                <a:schemeClr val="tx1"/>
+              </a:solidFill>
+              <a:headEnd type="none" w="med" len="med"/>
+              <a:tailEnd type="arrow" w="med" len="med"/>
+            </a:ln>
+          </p:spPr>
+          <p:style>
+            <a:lnRef idx="1">
+              <a:schemeClr val="accent1"/>
+            </a:lnRef>
+            <a:fillRef idx="0">
+              <a:schemeClr val="accent1"/>
+            </a:fillRef>
+            <a:effectRef idx="0">
+              <a:schemeClr val="accent1"/>
+            </a:effectRef>
+            <a:fontRef idx="minor">
+              <a:schemeClr val="tx1"/>
+            </a:fontRef>
+          </p:style>
+        </p:cxnSp>
+        <p:sp>
+          <p:nvSpPr>
+            <p:cNvPr id="26" name="Rectangle 25">
+              <a:extLst>
+                <a:ext uri="{FF2B5EF4-FFF2-40B4-BE49-F238E27FC236}">
+                  <a16:creationId xmlns:a16="http://schemas.microsoft.com/office/drawing/2014/main" id="{3EA557C6-3DB0-4013-8762-71EBBD6BBF38}"/>
+                </a:ext>
+              </a:extLst>
+            </p:cNvPr>
+            <p:cNvSpPr/>
+            <p:nvPr/>
+          </p:nvSpPr>
+          <p:spPr>
+            <a:xfrm>
+              <a:off x="3326979" y="1548628"/>
+              <a:ext cx="1512000" cy="540000"/>
+            </a:xfrm>
+            <a:prstGeom prst="rect">
+              <a:avLst/>
+            </a:prstGeom>
+            <a:noFill/>
+            <a:ln>
+              <a:solidFill>
+                <a:schemeClr val="tx1"/>
+              </a:solidFill>
+            </a:ln>
+          </p:spPr>
+          <p:style>
+            <a:lnRef idx="2">
+              <a:schemeClr val="accent1">
+                <a:shade val="50000"/>
+              </a:schemeClr>
+            </a:lnRef>
+            <a:fillRef idx="1">
+              <a:schemeClr val="accent1"/>
+            </a:fillRef>
+            <a:effectRef idx="0">
+              <a:schemeClr val="accent1"/>
+            </a:effectRef>
+            <a:fontRef idx="minor">
+              <a:schemeClr val="lt1"/>
+            </a:fontRef>
+          </p:style>
+          <p:txBody>
+            <a:bodyPr rtlCol="0" anchor="ctr"/>
+            <a:lstStyle/>
+            <a:p>
+              <a:pPr algn="ctr"/>
+              <a:r>
+                <a:rPr lang="en-US" sz="1600" dirty="0">
+                  <a:solidFill>
+                    <a:schemeClr val="tx1"/>
+                  </a:solidFill>
+                </a:rPr>
+                <a:t>Input from User</a:t>
+              </a:r>
+            </a:p>
+          </p:txBody>
+        </p:sp>
+        <p:cxnSp>
+          <p:nvCxnSpPr>
+            <p:cNvPr id="27" name="Straight Arrow Connector 26">
+              <a:extLst>
+                <a:ext uri="{FF2B5EF4-FFF2-40B4-BE49-F238E27FC236}">
+                  <a16:creationId xmlns:a16="http://schemas.microsoft.com/office/drawing/2014/main" id="{7B5CFB8C-918B-49A7-B3C1-CAE68EA1C2C8}"/>
+                </a:ext>
+              </a:extLst>
+            </p:cNvPr>
+            <p:cNvCxnSpPr>
+              <a:cxnSpLocks/>
+              <a:stCxn id="26" idx="2"/>
+              <a:endCxn id="16" idx="0"/>
+            </p:cNvCxnSpPr>
+            <p:nvPr/>
+          </p:nvCxnSpPr>
+          <p:spPr>
+            <a:xfrm>
+              <a:off x="4082979" y="2088628"/>
+              <a:ext cx="0" cy="292099"/>
+            </a:xfrm>
+            <a:prstGeom prst="straightConnector1">
+              <a:avLst/>
+            </a:prstGeom>
+            <a:ln w="28575">
+              <a:solidFill>
+                <a:schemeClr val="tx1"/>
+              </a:solidFill>
+              <a:headEnd type="none" w="med" len="med"/>
+              <a:tailEnd type="arrow" w="med" len="med"/>
+            </a:ln>
+          </p:spPr>
+          <p:style>
+            <a:lnRef idx="1">
+              <a:schemeClr val="accent1"/>
+            </a:lnRef>
+            <a:fillRef idx="0">
+              <a:schemeClr val="accent1"/>
+            </a:fillRef>
+            <a:effectRef idx="0">
+              <a:schemeClr val="accent1"/>
+            </a:effectRef>
+            <a:fontRef idx="minor">
+              <a:schemeClr val="tx1"/>
+            </a:fontRef>
+          </p:style>
+        </p:cxnSp>
+      </p:grpSp>
     </p:spTree>
     <p:extLst>
       <p:ext uri="{BB962C8B-B14F-4D97-AF65-F5344CB8AC3E}">
@@ -44818,854 +46215,10 @@
   <p:clrMapOvr>
     <a:masterClrMapping/>
   </p:clrMapOvr>
-  <p:timing>
-    <p:tnLst>
-      <p:par>
-        <p:cTn id="1" dur="indefinite" restart="never" nodeType="tmRoot">
-          <p:childTnLst>
-            <p:seq concurrent="1" nextAc="seek">
-              <p:cTn id="2" dur="indefinite" nodeType="mainSeq">
-                <p:childTnLst>
-                  <p:par>
-                    <p:cTn id="3" fill="hold">
-                      <p:stCondLst>
-                        <p:cond delay="indefinite"/>
-                      </p:stCondLst>
-                      <p:childTnLst>
-                        <p:par>
-                          <p:cTn id="4" fill="hold">
-                            <p:stCondLst>
-                              <p:cond delay="0"/>
-                            </p:stCondLst>
-                            <p:childTnLst>
-                              <p:par>
-                                <p:cTn id="5" presetID="1" presetClass="entr" presetSubtype="0" fill="hold" nodeType="clickEffect">
-                                  <p:stCondLst>
-                                    <p:cond delay="0"/>
-                                  </p:stCondLst>
-                                  <p:childTnLst>
-                                    <p:set>
-                                      <p:cBhvr>
-                                        <p:cTn id="6" dur="1" fill="hold">
-                                          <p:stCondLst>
-                                            <p:cond delay="0"/>
-                                          </p:stCondLst>
-                                        </p:cTn>
-                                        <p:tgtEl>
-                                          <p:spTgt spid="107"/>
-                                        </p:tgtEl>
-                                        <p:attrNameLst>
-                                          <p:attrName>style.visibility</p:attrName>
-                                        </p:attrNameLst>
-                                      </p:cBhvr>
-                                      <p:to>
-                                        <p:strVal val="visible"/>
-                                      </p:to>
-                                    </p:set>
-                                  </p:childTnLst>
-                                </p:cTn>
-                              </p:par>
-                              <p:par>
-                                <p:cTn id="7" presetID="1" presetClass="entr" presetSubtype="0" fill="hold" grpId="0" nodeType="withEffect">
-                                  <p:stCondLst>
-                                    <p:cond delay="0"/>
-                                  </p:stCondLst>
-                                  <p:childTnLst>
-                                    <p:set>
-                                      <p:cBhvr>
-                                        <p:cTn id="8" dur="1" fill="hold">
-                                          <p:stCondLst>
-                                            <p:cond delay="0"/>
-                                          </p:stCondLst>
-                                        </p:cTn>
-                                        <p:tgtEl>
-                                          <p:spTgt spid="103"/>
-                                        </p:tgtEl>
-                                        <p:attrNameLst>
-                                          <p:attrName>style.visibility</p:attrName>
-                                        </p:attrNameLst>
-                                      </p:cBhvr>
-                                      <p:to>
-                                        <p:strVal val="visible"/>
-                                      </p:to>
-                                    </p:set>
-                                  </p:childTnLst>
-                                </p:cTn>
-                              </p:par>
-                            </p:childTnLst>
-                          </p:cTn>
-                        </p:par>
-                      </p:childTnLst>
-                    </p:cTn>
-                  </p:par>
-                  <p:par>
-                    <p:cTn id="9" fill="hold">
-                      <p:stCondLst>
-                        <p:cond delay="indefinite"/>
-                      </p:stCondLst>
-                      <p:childTnLst>
-                        <p:par>
-                          <p:cTn id="10" fill="hold">
-                            <p:stCondLst>
-                              <p:cond delay="0"/>
-                            </p:stCondLst>
-                            <p:childTnLst>
-                              <p:par>
-                                <p:cTn id="11" presetID="1" presetClass="entr" presetSubtype="0" fill="hold" nodeType="clickEffect">
-                                  <p:stCondLst>
-                                    <p:cond delay="0"/>
-                                  </p:stCondLst>
-                                  <p:childTnLst>
-                                    <p:set>
-                                      <p:cBhvr>
-                                        <p:cTn id="12" dur="1" fill="hold">
-                                          <p:stCondLst>
-                                            <p:cond delay="0"/>
-                                          </p:stCondLst>
-                                        </p:cTn>
-                                        <p:tgtEl>
-                                          <p:spTgt spid="110"/>
-                                        </p:tgtEl>
-                                        <p:attrNameLst>
-                                          <p:attrName>style.visibility</p:attrName>
-                                        </p:attrNameLst>
-                                      </p:cBhvr>
-                                      <p:to>
-                                        <p:strVal val="visible"/>
-                                      </p:to>
-                                    </p:set>
-                                  </p:childTnLst>
-                                </p:cTn>
-                              </p:par>
-                              <p:par>
-                                <p:cTn id="13" presetID="1" presetClass="entr" presetSubtype="0" fill="hold" grpId="0" nodeType="withEffect">
-                                  <p:stCondLst>
-                                    <p:cond delay="0"/>
-                                  </p:stCondLst>
-                                  <p:childTnLst>
-                                    <p:set>
-                                      <p:cBhvr>
-                                        <p:cTn id="14" dur="1" fill="hold">
-                                          <p:stCondLst>
-                                            <p:cond delay="0"/>
-                                          </p:stCondLst>
-                                        </p:cTn>
-                                        <p:tgtEl>
-                                          <p:spTgt spid="106"/>
-                                        </p:tgtEl>
-                                        <p:attrNameLst>
-                                          <p:attrName>style.visibility</p:attrName>
-                                        </p:attrNameLst>
-                                      </p:cBhvr>
-                                      <p:to>
-                                        <p:strVal val="visible"/>
-                                      </p:to>
-                                    </p:set>
-                                  </p:childTnLst>
-                                </p:cTn>
-                              </p:par>
-                            </p:childTnLst>
-                          </p:cTn>
-                        </p:par>
-                      </p:childTnLst>
-                    </p:cTn>
-                  </p:par>
-                  <p:par>
-                    <p:cTn id="15" fill="hold">
-                      <p:stCondLst>
-                        <p:cond delay="indefinite"/>
-                      </p:stCondLst>
-                      <p:childTnLst>
-                        <p:par>
-                          <p:cTn id="16" fill="hold">
-                            <p:stCondLst>
-                              <p:cond delay="0"/>
-                            </p:stCondLst>
-                            <p:childTnLst>
-                              <p:par>
-                                <p:cTn id="17" presetID="1" presetClass="entr" presetSubtype="0" fill="hold" grpId="0" nodeType="clickEffect">
-                                  <p:stCondLst>
-                                    <p:cond delay="0"/>
-                                  </p:stCondLst>
-                                  <p:childTnLst>
-                                    <p:set>
-                                      <p:cBhvr>
-                                        <p:cTn id="18" dur="1" fill="hold">
-                                          <p:stCondLst>
-                                            <p:cond delay="0"/>
-                                          </p:stCondLst>
-                                        </p:cTn>
-                                        <p:tgtEl>
-                                          <p:spTgt spid="26"/>
-                                        </p:tgtEl>
-                                        <p:attrNameLst>
-                                          <p:attrName>style.visibility</p:attrName>
-                                        </p:attrNameLst>
-                                      </p:cBhvr>
-                                      <p:to>
-                                        <p:strVal val="visible"/>
-                                      </p:to>
-                                    </p:set>
-                                  </p:childTnLst>
-                                </p:cTn>
-                              </p:par>
-                              <p:par>
-                                <p:cTn id="19" presetID="1" presetClass="entr" presetSubtype="0" fill="hold" nodeType="withEffect">
-                                  <p:stCondLst>
-                                    <p:cond delay="0"/>
-                                  </p:stCondLst>
-                                  <p:childTnLst>
-                                    <p:set>
-                                      <p:cBhvr>
-                                        <p:cTn id="20" dur="1" fill="hold">
-                                          <p:stCondLst>
-                                            <p:cond delay="0"/>
-                                          </p:stCondLst>
-                                        </p:cTn>
-                                        <p:tgtEl>
-                                          <p:spTgt spid="27"/>
-                                        </p:tgtEl>
-                                        <p:attrNameLst>
-                                          <p:attrName>style.visibility</p:attrName>
-                                        </p:attrNameLst>
-                                      </p:cBhvr>
-                                      <p:to>
-                                        <p:strVal val="visible"/>
-                                      </p:to>
-                                    </p:set>
-                                  </p:childTnLst>
-                                </p:cTn>
-                              </p:par>
-                              <p:par>
-                                <p:cTn id="21" presetID="1" presetClass="entr" presetSubtype="0" fill="hold" grpId="0" nodeType="withEffect">
-                                  <p:stCondLst>
-                                    <p:cond delay="0"/>
-                                  </p:stCondLst>
-                                  <p:childTnLst>
-                                    <p:set>
-                                      <p:cBhvr>
-                                        <p:cTn id="22" dur="1" fill="hold">
-                                          <p:stCondLst>
-                                            <p:cond delay="0"/>
-                                          </p:stCondLst>
-                                        </p:cTn>
-                                        <p:tgtEl>
-                                          <p:spTgt spid="16"/>
-                                        </p:tgtEl>
-                                        <p:attrNameLst>
-                                          <p:attrName>style.visibility</p:attrName>
-                                        </p:attrNameLst>
-                                      </p:cBhvr>
-                                      <p:to>
-                                        <p:strVal val="visible"/>
-                                      </p:to>
-                                    </p:set>
-                                  </p:childTnLst>
-                                </p:cTn>
-                              </p:par>
-                            </p:childTnLst>
-                          </p:cTn>
-                        </p:par>
-                      </p:childTnLst>
-                    </p:cTn>
-                  </p:par>
-                  <p:par>
-                    <p:cTn id="23" fill="hold">
-                      <p:stCondLst>
-                        <p:cond delay="indefinite"/>
-                      </p:stCondLst>
-                      <p:childTnLst>
-                        <p:par>
-                          <p:cTn id="24" fill="hold">
-                            <p:stCondLst>
-                              <p:cond delay="0"/>
-                            </p:stCondLst>
-                            <p:childTnLst>
-                              <p:par>
-                                <p:cTn id="25" presetID="1" presetClass="entr" presetSubtype="0" fill="hold" nodeType="clickEffect">
-                                  <p:stCondLst>
-                                    <p:cond delay="0"/>
-                                  </p:stCondLst>
-                                  <p:childTnLst>
-                                    <p:set>
-                                      <p:cBhvr>
-                                        <p:cTn id="26" dur="1" fill="hold">
-                                          <p:stCondLst>
-                                            <p:cond delay="0"/>
-                                          </p:stCondLst>
-                                        </p:cTn>
-                                        <p:tgtEl>
-                                          <p:spTgt spid="113"/>
-                                        </p:tgtEl>
-                                        <p:attrNameLst>
-                                          <p:attrName>style.visibility</p:attrName>
-                                        </p:attrNameLst>
-                                      </p:cBhvr>
-                                      <p:to>
-                                        <p:strVal val="visible"/>
-                                      </p:to>
-                                    </p:set>
-                                  </p:childTnLst>
-                                </p:cTn>
-                              </p:par>
-                              <p:par>
-                                <p:cTn id="27" presetID="1" presetClass="entr" presetSubtype="0" fill="hold" nodeType="withEffect">
-                                  <p:stCondLst>
-                                    <p:cond delay="0"/>
-                                  </p:stCondLst>
-                                  <p:childTnLst>
-                                    <p:set>
-                                      <p:cBhvr>
-                                        <p:cTn id="28" dur="1" fill="hold">
-                                          <p:stCondLst>
-                                            <p:cond delay="0"/>
-                                          </p:stCondLst>
-                                        </p:cTn>
-                                        <p:tgtEl>
-                                          <p:spTgt spid="19"/>
-                                        </p:tgtEl>
-                                        <p:attrNameLst>
-                                          <p:attrName>style.visibility</p:attrName>
-                                        </p:attrNameLst>
-                                      </p:cBhvr>
-                                      <p:to>
-                                        <p:strVal val="visible"/>
-                                      </p:to>
-                                    </p:set>
-                                  </p:childTnLst>
-                                </p:cTn>
-                              </p:par>
-                              <p:par>
-                                <p:cTn id="29" presetID="1" presetClass="entr" presetSubtype="0" fill="hold" grpId="0" nodeType="withEffect">
-                                  <p:stCondLst>
-                                    <p:cond delay="0"/>
-                                  </p:stCondLst>
-                                  <p:childTnLst>
-                                    <p:set>
-                                      <p:cBhvr>
-                                        <p:cTn id="30" dur="1" fill="hold">
-                                          <p:stCondLst>
-                                            <p:cond delay="0"/>
-                                          </p:stCondLst>
-                                        </p:cTn>
-                                        <p:tgtEl>
-                                          <p:spTgt spid="9"/>
-                                        </p:tgtEl>
-                                        <p:attrNameLst>
-                                          <p:attrName>style.visibility</p:attrName>
-                                        </p:attrNameLst>
-                                      </p:cBhvr>
-                                      <p:to>
-                                        <p:strVal val="visible"/>
-                                      </p:to>
-                                    </p:set>
-                                  </p:childTnLst>
-                                </p:cTn>
-                              </p:par>
-                            </p:childTnLst>
-                          </p:cTn>
-                        </p:par>
-                      </p:childTnLst>
-                    </p:cTn>
-                  </p:par>
-                  <p:par>
-                    <p:cTn id="31" fill="hold">
-                      <p:stCondLst>
-                        <p:cond delay="indefinite"/>
-                      </p:stCondLst>
-                      <p:childTnLst>
-                        <p:par>
-                          <p:cTn id="32" fill="hold">
-                            <p:stCondLst>
-                              <p:cond delay="0"/>
-                            </p:stCondLst>
-                            <p:childTnLst>
-                              <p:par>
-                                <p:cTn id="33" presetID="1" presetClass="entr" presetSubtype="0" fill="hold" nodeType="clickEffect">
-                                  <p:stCondLst>
-                                    <p:cond delay="0"/>
-                                  </p:stCondLst>
-                                  <p:childTnLst>
-                                    <p:set>
-                                      <p:cBhvr>
-                                        <p:cTn id="34" dur="1" fill="hold">
-                                          <p:stCondLst>
-                                            <p:cond delay="0"/>
-                                          </p:stCondLst>
-                                        </p:cTn>
-                                        <p:tgtEl>
-                                          <p:spTgt spid="21"/>
-                                        </p:tgtEl>
-                                        <p:attrNameLst>
-                                          <p:attrName>style.visibility</p:attrName>
-                                        </p:attrNameLst>
-                                      </p:cBhvr>
-                                      <p:to>
-                                        <p:strVal val="visible"/>
-                                      </p:to>
-                                    </p:set>
-                                  </p:childTnLst>
-                                </p:cTn>
-                              </p:par>
-                              <p:par>
-                                <p:cTn id="35" presetID="1" presetClass="entr" presetSubtype="0" fill="hold" grpId="0" nodeType="withEffect">
-                                  <p:stCondLst>
-                                    <p:cond delay="0"/>
-                                  </p:stCondLst>
-                                  <p:childTnLst>
-                                    <p:set>
-                                      <p:cBhvr>
-                                        <p:cTn id="36" dur="1" fill="hold">
-                                          <p:stCondLst>
-                                            <p:cond delay="0"/>
-                                          </p:stCondLst>
-                                        </p:cTn>
-                                        <p:tgtEl>
-                                          <p:spTgt spid="17"/>
-                                        </p:tgtEl>
-                                        <p:attrNameLst>
-                                          <p:attrName>style.visibility</p:attrName>
-                                        </p:attrNameLst>
-                                      </p:cBhvr>
-                                      <p:to>
-                                        <p:strVal val="visible"/>
-                                      </p:to>
-                                    </p:set>
-                                  </p:childTnLst>
-                                </p:cTn>
-                              </p:par>
-                            </p:childTnLst>
-                          </p:cTn>
-                        </p:par>
-                      </p:childTnLst>
-                    </p:cTn>
-                  </p:par>
-                  <p:par>
-                    <p:cTn id="37" fill="hold">
-                      <p:stCondLst>
-                        <p:cond delay="indefinite"/>
-                      </p:stCondLst>
-                      <p:childTnLst>
-                        <p:par>
-                          <p:cTn id="38" fill="hold">
-                            <p:stCondLst>
-                              <p:cond delay="0"/>
-                            </p:stCondLst>
-                            <p:childTnLst>
-                              <p:par>
-                                <p:cTn id="39" presetID="1" presetClass="entr" presetSubtype="0" fill="hold" nodeType="clickEffect">
-                                  <p:stCondLst>
-                                    <p:cond delay="0"/>
-                                  </p:stCondLst>
-                                  <p:childTnLst>
-                                    <p:set>
-                                      <p:cBhvr>
-                                        <p:cTn id="40" dur="1" fill="hold">
-                                          <p:stCondLst>
-                                            <p:cond delay="0"/>
-                                          </p:stCondLst>
-                                        </p:cTn>
-                                        <p:tgtEl>
-                                          <p:spTgt spid="23"/>
-                                        </p:tgtEl>
-                                        <p:attrNameLst>
-                                          <p:attrName>style.visibility</p:attrName>
-                                        </p:attrNameLst>
-                                      </p:cBhvr>
-                                      <p:to>
-                                        <p:strVal val="visible"/>
-                                      </p:to>
-                                    </p:set>
-                                  </p:childTnLst>
-                                </p:cTn>
-                              </p:par>
-                              <p:par>
-                                <p:cTn id="41" presetID="1" presetClass="entr" presetSubtype="0" fill="hold" nodeType="withEffect">
-                                  <p:stCondLst>
-                                    <p:cond delay="0"/>
-                                  </p:stCondLst>
-                                  <p:childTnLst>
-                                    <p:set>
-                                      <p:cBhvr>
-                                        <p:cTn id="42" dur="1" fill="hold">
-                                          <p:stCondLst>
-                                            <p:cond delay="0"/>
-                                          </p:stCondLst>
-                                        </p:cTn>
-                                        <p:tgtEl>
-                                          <p:spTgt spid="116"/>
-                                        </p:tgtEl>
-                                        <p:attrNameLst>
-                                          <p:attrName>style.visibility</p:attrName>
-                                        </p:attrNameLst>
-                                      </p:cBhvr>
-                                      <p:to>
-                                        <p:strVal val="visible"/>
-                                      </p:to>
-                                    </p:set>
-                                  </p:childTnLst>
-                                </p:cTn>
-                              </p:par>
-                              <p:par>
-                                <p:cTn id="43" presetID="1" presetClass="entr" presetSubtype="0" fill="hold" grpId="0" nodeType="withEffect">
-                                  <p:stCondLst>
-                                    <p:cond delay="0"/>
-                                  </p:stCondLst>
-                                  <p:childTnLst>
-                                    <p:set>
-                                      <p:cBhvr>
-                                        <p:cTn id="44" dur="1" fill="hold">
-                                          <p:stCondLst>
-                                            <p:cond delay="0"/>
-                                          </p:stCondLst>
-                                        </p:cTn>
-                                        <p:tgtEl>
-                                          <p:spTgt spid="10"/>
-                                        </p:tgtEl>
-                                        <p:attrNameLst>
-                                          <p:attrName>style.visibility</p:attrName>
-                                        </p:attrNameLst>
-                                      </p:cBhvr>
-                                      <p:to>
-                                        <p:strVal val="visible"/>
-                                      </p:to>
-                                    </p:set>
-                                  </p:childTnLst>
-                                </p:cTn>
-                              </p:par>
-                            </p:childTnLst>
-                          </p:cTn>
-                        </p:par>
-                      </p:childTnLst>
-                    </p:cTn>
-                  </p:par>
-                  <p:par>
-                    <p:cTn id="45" fill="hold">
-                      <p:stCondLst>
-                        <p:cond delay="indefinite"/>
-                      </p:stCondLst>
-                      <p:childTnLst>
-                        <p:par>
-                          <p:cTn id="46" fill="hold">
-                            <p:stCondLst>
-                              <p:cond delay="0"/>
-                            </p:stCondLst>
-                            <p:childTnLst>
-                              <p:par>
-                                <p:cTn id="47" presetID="1" presetClass="entr" presetSubtype="0" fill="hold" nodeType="clickEffect">
-                                  <p:stCondLst>
-                                    <p:cond delay="0"/>
-                                  </p:stCondLst>
-                                  <p:childTnLst>
-                                    <p:set>
-                                      <p:cBhvr>
-                                        <p:cTn id="48" dur="1" fill="hold">
-                                          <p:stCondLst>
-                                            <p:cond delay="0"/>
-                                          </p:stCondLst>
-                                        </p:cTn>
-                                        <p:tgtEl>
-                                          <p:spTgt spid="33"/>
-                                        </p:tgtEl>
-                                        <p:attrNameLst>
-                                          <p:attrName>style.visibility</p:attrName>
-                                        </p:attrNameLst>
-                                      </p:cBhvr>
-                                      <p:to>
-                                        <p:strVal val="visible"/>
-                                      </p:to>
-                                    </p:set>
-                                  </p:childTnLst>
-                                </p:cTn>
-                              </p:par>
-                              <p:par>
-                                <p:cTn id="49" presetID="1" presetClass="entr" presetSubtype="0" fill="hold" grpId="0" nodeType="withEffect">
-                                  <p:stCondLst>
-                                    <p:cond delay="0"/>
-                                  </p:stCondLst>
-                                  <p:childTnLst>
-                                    <p:set>
-                                      <p:cBhvr>
-                                        <p:cTn id="50" dur="1" fill="hold">
-                                          <p:stCondLst>
-                                            <p:cond delay="0"/>
-                                          </p:stCondLst>
-                                        </p:cTn>
-                                        <p:tgtEl>
-                                          <p:spTgt spid="31"/>
-                                        </p:tgtEl>
-                                        <p:attrNameLst>
-                                          <p:attrName>style.visibility</p:attrName>
-                                        </p:attrNameLst>
-                                      </p:cBhvr>
-                                      <p:to>
-                                        <p:strVal val="visible"/>
-                                      </p:to>
-                                    </p:set>
-                                  </p:childTnLst>
-                                </p:cTn>
-                              </p:par>
-                            </p:childTnLst>
-                          </p:cTn>
-                        </p:par>
-                      </p:childTnLst>
-                    </p:cTn>
-                  </p:par>
-                  <p:par>
-                    <p:cTn id="51" fill="hold">
-                      <p:stCondLst>
-                        <p:cond delay="indefinite"/>
-                      </p:stCondLst>
-                      <p:childTnLst>
-                        <p:par>
-                          <p:cTn id="52" fill="hold">
-                            <p:stCondLst>
-                              <p:cond delay="0"/>
-                            </p:stCondLst>
-                            <p:childTnLst>
-                              <p:par>
-                                <p:cTn id="53" presetID="1" presetClass="entr" presetSubtype="0" fill="hold" nodeType="clickEffect">
-                                  <p:stCondLst>
-                                    <p:cond delay="0"/>
-                                  </p:stCondLst>
-                                  <p:childTnLst>
-                                    <p:set>
-                                      <p:cBhvr>
-                                        <p:cTn id="54" dur="1" fill="hold">
-                                          <p:stCondLst>
-                                            <p:cond delay="0"/>
-                                          </p:stCondLst>
-                                        </p:cTn>
-                                        <p:tgtEl>
-                                          <p:spTgt spid="39"/>
-                                        </p:tgtEl>
-                                        <p:attrNameLst>
-                                          <p:attrName>style.visibility</p:attrName>
-                                        </p:attrNameLst>
-                                      </p:cBhvr>
-                                      <p:to>
-                                        <p:strVal val="visible"/>
-                                      </p:to>
-                                    </p:set>
-                                  </p:childTnLst>
-                                </p:cTn>
-                              </p:par>
-                              <p:par>
-                                <p:cTn id="55" presetID="1" presetClass="entr" presetSubtype="0" fill="hold" nodeType="withEffect">
-                                  <p:stCondLst>
-                                    <p:cond delay="0"/>
-                                  </p:stCondLst>
-                                  <p:childTnLst>
-                                    <p:set>
-                                      <p:cBhvr>
-                                        <p:cTn id="56" dur="1" fill="hold">
-                                          <p:stCondLst>
-                                            <p:cond delay="0"/>
-                                          </p:stCondLst>
-                                        </p:cTn>
-                                        <p:tgtEl>
-                                          <p:spTgt spid="119"/>
-                                        </p:tgtEl>
-                                        <p:attrNameLst>
-                                          <p:attrName>style.visibility</p:attrName>
-                                        </p:attrNameLst>
-                                      </p:cBhvr>
-                                      <p:to>
-                                        <p:strVal val="visible"/>
-                                      </p:to>
-                                    </p:set>
-                                  </p:childTnLst>
-                                </p:cTn>
-                              </p:par>
-                              <p:par>
-                                <p:cTn id="57" presetID="1" presetClass="entr" presetSubtype="0" fill="hold" grpId="0" nodeType="withEffect">
-                                  <p:stCondLst>
-                                    <p:cond delay="0"/>
-                                  </p:stCondLst>
-                                  <p:childTnLst>
-                                    <p:set>
-                                      <p:cBhvr>
-                                        <p:cTn id="58" dur="1" fill="hold">
-                                          <p:stCondLst>
-                                            <p:cond delay="0"/>
-                                          </p:stCondLst>
-                                        </p:cTn>
-                                        <p:tgtEl>
-                                          <p:spTgt spid="11"/>
-                                        </p:tgtEl>
-                                        <p:attrNameLst>
-                                          <p:attrName>style.visibility</p:attrName>
-                                        </p:attrNameLst>
-                                      </p:cBhvr>
-                                      <p:to>
-                                        <p:strVal val="visible"/>
-                                      </p:to>
-                                    </p:set>
-                                  </p:childTnLst>
-                                </p:cTn>
-                              </p:par>
-                            </p:childTnLst>
-                          </p:cTn>
-                        </p:par>
-                      </p:childTnLst>
-                    </p:cTn>
-                  </p:par>
-                  <p:par>
-                    <p:cTn id="59" fill="hold">
-                      <p:stCondLst>
-                        <p:cond delay="indefinite"/>
-                      </p:stCondLst>
-                      <p:childTnLst>
-                        <p:par>
-                          <p:cTn id="60" fill="hold">
-                            <p:stCondLst>
-                              <p:cond delay="0"/>
-                            </p:stCondLst>
-                            <p:childTnLst>
-                              <p:par>
-                                <p:cTn id="61" presetID="1" presetClass="entr" presetSubtype="0" fill="hold" nodeType="clickEffect">
-                                  <p:stCondLst>
-                                    <p:cond delay="0"/>
-                                  </p:stCondLst>
-                                  <p:childTnLst>
-                                    <p:set>
-                                      <p:cBhvr>
-                                        <p:cTn id="62" dur="1" fill="hold">
-                                          <p:stCondLst>
-                                            <p:cond delay="0"/>
-                                          </p:stCondLst>
-                                        </p:cTn>
-                                        <p:tgtEl>
-                                          <p:spTgt spid="46"/>
-                                        </p:tgtEl>
-                                        <p:attrNameLst>
-                                          <p:attrName>style.visibility</p:attrName>
-                                        </p:attrNameLst>
-                                      </p:cBhvr>
-                                      <p:to>
-                                        <p:strVal val="visible"/>
-                                      </p:to>
-                                    </p:set>
-                                  </p:childTnLst>
-                                </p:cTn>
-                              </p:par>
-                              <p:par>
-                                <p:cTn id="63" presetID="1" presetClass="entr" presetSubtype="0" fill="hold" grpId="0" nodeType="withEffect">
-                                  <p:stCondLst>
-                                    <p:cond delay="0"/>
-                                  </p:stCondLst>
-                                  <p:childTnLst>
-                                    <p:set>
-                                      <p:cBhvr>
-                                        <p:cTn id="64" dur="1" fill="hold">
-                                          <p:stCondLst>
-                                            <p:cond delay="0"/>
-                                          </p:stCondLst>
-                                        </p:cTn>
-                                        <p:tgtEl>
-                                          <p:spTgt spid="44"/>
-                                        </p:tgtEl>
-                                        <p:attrNameLst>
-                                          <p:attrName>style.visibility</p:attrName>
-                                        </p:attrNameLst>
-                                      </p:cBhvr>
-                                      <p:to>
-                                        <p:strVal val="visible"/>
-                                      </p:to>
-                                    </p:set>
-                                  </p:childTnLst>
-                                </p:cTn>
-                              </p:par>
-                            </p:childTnLst>
-                          </p:cTn>
-                        </p:par>
-                      </p:childTnLst>
-                    </p:cTn>
-                  </p:par>
-                  <p:par>
-                    <p:cTn id="65" fill="hold">
-                      <p:stCondLst>
-                        <p:cond delay="indefinite"/>
-                      </p:stCondLst>
-                      <p:childTnLst>
-                        <p:par>
-                          <p:cTn id="66" fill="hold">
-                            <p:stCondLst>
-                              <p:cond delay="0"/>
-                            </p:stCondLst>
-                            <p:childTnLst>
-                              <p:par>
-                                <p:cTn id="67" presetID="1" presetClass="entr" presetSubtype="0" fill="hold" grpId="0" nodeType="clickEffect">
-                                  <p:stCondLst>
-                                    <p:cond delay="0"/>
-                                  </p:stCondLst>
-                                  <p:childTnLst>
-                                    <p:set>
-                                      <p:cBhvr>
-                                        <p:cTn id="68" dur="1" fill="hold">
-                                          <p:stCondLst>
-                                            <p:cond delay="0"/>
-                                          </p:stCondLst>
-                                        </p:cTn>
-                                        <p:tgtEl>
-                                          <p:spTgt spid="90"/>
-                                        </p:tgtEl>
-                                        <p:attrNameLst>
-                                          <p:attrName>style.visibility</p:attrName>
-                                        </p:attrNameLst>
-                                      </p:cBhvr>
-                                      <p:to>
-                                        <p:strVal val="visible"/>
-                                      </p:to>
-                                    </p:set>
-                                  </p:childTnLst>
-                                </p:cTn>
-                              </p:par>
-                            </p:childTnLst>
-                          </p:cTn>
-                        </p:par>
-                      </p:childTnLst>
-                    </p:cTn>
-                  </p:par>
-                </p:childTnLst>
-              </p:cTn>
-              <p:prevCondLst>
-                <p:cond evt="onPrev" delay="0">
-                  <p:tgtEl>
-                    <p:sldTgt/>
-                  </p:tgtEl>
-                </p:cond>
-              </p:prevCondLst>
-              <p:nextCondLst>
-                <p:cond evt="onNext" delay="0">
-                  <p:tgtEl>
-                    <p:sldTgt/>
-                  </p:tgtEl>
-                </p:cond>
-              </p:nextCondLst>
-            </p:seq>
-          </p:childTnLst>
-        </p:cTn>
-      </p:par>
-    </p:tnLst>
-    <p:bldLst>
-      <p:bldP spid="9" grpId="0" animBg="1"/>
-      <p:bldP spid="10" grpId="0" animBg="1"/>
-      <p:bldP spid="11" grpId="0" animBg="1"/>
-      <p:bldP spid="16" grpId="0" animBg="1"/>
-      <p:bldP spid="17" grpId="0" animBg="1"/>
-      <p:bldP spid="31" grpId="0" animBg="1"/>
-      <p:bldP spid="44" grpId="0" animBg="1"/>
-      <p:bldP spid="90" grpId="0" animBg="1"/>
-      <p:bldP spid="103" grpId="0" animBg="1"/>
-      <p:bldP spid="106" grpId="0" animBg="1"/>
-      <p:bldP spid="26" grpId="0" animBg="1"/>
-    </p:bldLst>
-  </p:timing>
 </p:sld>
 </file>
 
-<file path=ppt/slides/slide11.xml><?xml version="1.0" encoding="utf-8"?>
+<file path=ppt/slides/slide12.xml><?xml version="1.0" encoding="utf-8"?>
 <p:sld xmlns:a="http://schemas.openxmlformats.org/drawingml/2006/main" xmlns:r="http://schemas.openxmlformats.org/officeDocument/2006/relationships" xmlns:p="http://schemas.openxmlformats.org/presentationml/2006/main">
   <p:cSld>
     <p:spTree>
@@ -45763,7 +46316,7 @@
 </p:sld>
 </file>
 
-<file path=ppt/slides/slide12.xml><?xml version="1.0" encoding="utf-8"?>
+<file path=ppt/slides/slide13.xml><?xml version="1.0" encoding="utf-8"?>
 <p:sld xmlns:a="http://schemas.openxmlformats.org/drawingml/2006/main" xmlns:r="http://schemas.openxmlformats.org/officeDocument/2006/relationships" xmlns:p="http://schemas.openxmlformats.org/presentationml/2006/main">
   <p:cSld>
     <p:spTree>
@@ -45926,7 +46479,7 @@
 </p:sld>
 </file>
 
-<file path=ppt/slides/slide13.xml><?xml version="1.0" encoding="utf-8"?>
+<file path=ppt/slides/slide14.xml><?xml version="1.0" encoding="utf-8"?>
 <p:sld xmlns:a="http://schemas.openxmlformats.org/drawingml/2006/main" xmlns:r="http://schemas.openxmlformats.org/officeDocument/2006/relationships" xmlns:p="http://schemas.openxmlformats.org/presentationml/2006/main">
   <p:cSld>
     <p:spTree>
@@ -46065,7 +46618,7 @@
 </p:sld>
 </file>
 
-<file path=ppt/slides/slide14.xml><?xml version="1.0" encoding="utf-8"?>
+<file path=ppt/slides/slide15.xml><?xml version="1.0" encoding="utf-8"?>
 <p:sld xmlns:a="http://schemas.openxmlformats.org/drawingml/2006/main" xmlns:r="http://schemas.openxmlformats.org/officeDocument/2006/relationships" xmlns:p="http://schemas.openxmlformats.org/presentationml/2006/main">
   <p:cSld>
     <p:spTree>
@@ -46209,7 +46762,7 @@
 </p:sld>
 </file>
 
-<file path=ppt/slides/slide15.xml><?xml version="1.0" encoding="utf-8"?>
+<file path=ppt/slides/slide16.xml><?xml version="1.0" encoding="utf-8"?>
 <p:sld xmlns:a="http://schemas.openxmlformats.org/drawingml/2006/main" xmlns:r="http://schemas.openxmlformats.org/officeDocument/2006/relationships" xmlns:p="http://schemas.openxmlformats.org/presentationml/2006/main">
   <p:cSld>
     <p:spTree>
@@ -46349,7 +46902,7 @@
 </p:sld>
 </file>
 
-<file path=ppt/slides/slide16.xml><?xml version="1.0" encoding="utf-8"?>
+<file path=ppt/slides/slide17.xml><?xml version="1.0" encoding="utf-8"?>
 <p:sld xmlns:a="http://schemas.openxmlformats.org/drawingml/2006/main" xmlns:r="http://schemas.openxmlformats.org/officeDocument/2006/relationships" xmlns:p="http://schemas.openxmlformats.org/presentationml/2006/main">
   <p:cSld>
     <p:spTree>
@@ -46572,7 +47125,7 @@
 </p:sld>
 </file>
 
-<file path=ppt/slides/slide17.xml><?xml version="1.0" encoding="utf-8"?>
+<file path=ppt/slides/slide18.xml><?xml version="1.0" encoding="utf-8"?>
 <p:sld xmlns:a="http://schemas.openxmlformats.org/drawingml/2006/main" xmlns:r="http://schemas.openxmlformats.org/officeDocument/2006/relationships" xmlns:p="http://schemas.openxmlformats.org/presentationml/2006/main">
   <p:cSld>
     <p:spTree>
@@ -46925,7 +47478,7 @@
 </p:sld>
 </file>
 
-<file path=ppt/slides/slide18.xml><?xml version="1.0" encoding="utf-8"?>
+<file path=ppt/slides/slide19.xml><?xml version="1.0" encoding="utf-8"?>
 <p:sld xmlns:a="http://schemas.openxmlformats.org/drawingml/2006/main" xmlns:r="http://schemas.openxmlformats.org/officeDocument/2006/relationships" xmlns:p="http://schemas.openxmlformats.org/presentationml/2006/main">
   <p:cSld>
     <p:spTree>
@@ -47335,7 +47888,118 @@
 </p:sld>
 </file>
 
-<file path=ppt/slides/slide19.xml><?xml version="1.0" encoding="utf-8"?>
+<file path=ppt/slides/slide2.xml><?xml version="1.0" encoding="utf-8"?>
+<p:sld xmlns:a="http://schemas.openxmlformats.org/drawingml/2006/main" xmlns:r="http://schemas.openxmlformats.org/officeDocument/2006/relationships" xmlns:p="http://schemas.openxmlformats.org/presentationml/2006/main">
+  <p:cSld>
+    <p:spTree>
+      <p:nvGrpSpPr>
+        <p:cNvPr id="1" name=""/>
+        <p:cNvGrpSpPr/>
+        <p:nvPr/>
+      </p:nvGrpSpPr>
+      <p:grpSpPr>
+        <a:xfrm>
+          <a:off x="0" y="0"/>
+          <a:ext cx="0" cy="0"/>
+          <a:chOff x="0" y="0"/>
+          <a:chExt cx="0" cy="0"/>
+        </a:xfrm>
+      </p:grpSpPr>
+      <p:sp>
+        <p:nvSpPr>
+          <p:cNvPr id="3" name="Content Placeholder 2">
+            <a:extLst>
+              <a:ext uri="{FF2B5EF4-FFF2-40B4-BE49-F238E27FC236}">
+                <a16:creationId xmlns:a16="http://schemas.microsoft.com/office/drawing/2014/main" id="{D8A3DCC0-BBC8-4671-8CBC-2A231CC18E7F}"/>
+              </a:ext>
+            </a:extLst>
+          </p:cNvPr>
+          <p:cNvSpPr>
+            <a:spLocks noGrp="1"/>
+          </p:cNvSpPr>
+          <p:nvPr>
+            <p:ph idx="1"/>
+          </p:nvPr>
+        </p:nvSpPr>
+        <p:spPr/>
+        <p:txBody>
+          <a:bodyPr>
+            <a:normAutofit lnSpcReduction="10000"/>
+          </a:bodyPr>
+          <a:lstStyle/>
+          <a:p>
+            <a:r>
+              <a:rPr lang="en-GB" dirty="0"/>
+              <a:t>Films/movies are an important art form, a source of popular entertainment, and a powerful medium of expression. </a:t>
+            </a:r>
+            <a:endParaRPr lang="en-US" dirty="0"/>
+          </a:p>
+          <a:p>
+            <a:r>
+              <a:rPr lang="en-US" dirty="0"/>
+              <a:t>It is also an entire industry comprising of </a:t>
+            </a:r>
+            <a:r>
+              <a:rPr lang="en-GB" dirty="0"/>
+              <a:t>film production companies, film studios, cinematography, animation, screenwriting, pre-production, postproduction, film festivals, actors, film directors and other film crew personnel.</a:t>
+            </a:r>
+          </a:p>
+          <a:p>
+            <a:r>
+              <a:rPr lang="en-GB" dirty="0"/>
+              <a:t>The economic impact of the film industry has been exponentially growing over time. The global film industry was worth an estimated $136 billion in 2018. </a:t>
+            </a:r>
+          </a:p>
+          <a:p>
+            <a:r>
+              <a:rPr lang="en-US" dirty="0"/>
+              <a:t>Of all the various factors contributing to the success of a movie, the popularity/traction of the cast tops the list. </a:t>
+            </a:r>
+          </a:p>
+        </p:txBody>
+      </p:sp>
+      <p:sp>
+        <p:nvSpPr>
+          <p:cNvPr id="2" name="Title 1">
+            <a:extLst>
+              <a:ext uri="{FF2B5EF4-FFF2-40B4-BE49-F238E27FC236}">
+                <a16:creationId xmlns:a16="http://schemas.microsoft.com/office/drawing/2014/main" id="{1F8E98EF-5675-49AE-8E43-09BAB23C8F3C}"/>
+              </a:ext>
+            </a:extLst>
+          </p:cNvPr>
+          <p:cNvSpPr>
+            <a:spLocks noGrp="1"/>
+          </p:cNvSpPr>
+          <p:nvPr>
+            <p:ph type="title"/>
+          </p:nvPr>
+        </p:nvSpPr>
+        <p:spPr/>
+        <p:txBody>
+          <a:bodyPr/>
+          <a:lstStyle/>
+          <a:p>
+            <a:r>
+              <a:rPr lang="en-US" dirty="0"/>
+              <a:t>Introduction</a:t>
+            </a:r>
+          </a:p>
+        </p:txBody>
+      </p:sp>
+    </p:spTree>
+    <p:extLst>
+      <p:ext uri="{BB962C8B-B14F-4D97-AF65-F5344CB8AC3E}">
+        <p14:creationId xmlns:p14="http://schemas.microsoft.com/office/powerpoint/2010/main" val="1621250363"/>
+      </p:ext>
+    </p:extLst>
+  </p:cSld>
+  <p:clrMapOvr>
+    <a:masterClrMapping/>
+  </p:clrMapOvr>
+</p:sld>
+</file>
+
+<file path=ppt/slides/slide20.xml><?xml version="1.0" encoding="utf-8"?>
 <p:sld xmlns:a="http://schemas.openxmlformats.org/drawingml/2006/main" xmlns:r="http://schemas.openxmlformats.org/officeDocument/2006/relationships" xmlns:p="http://schemas.openxmlformats.org/presentationml/2006/main">
   <p:cSld>
     <p:spTree>
@@ -47527,7 +48191,7 @@
           <a:graphicData uri="http://schemas.openxmlformats.org/presentationml/2006/ole">
             <mc:AlternateContent xmlns:mc="http://schemas.openxmlformats.org/markup-compatibility/2006">
               <mc:Choice xmlns:v="urn:schemas-microsoft-com:vml" Requires="v">
-                <p:oleObj spid="_x0000_s1049" name="Worksheet" r:id="rId4" imgW="1283988" imgH="369484" progId="Excel.Sheet.12">
+                <p:oleObj spid="_x0000_s1057" name="Worksheet" r:id="rId4" imgW="1283988" imgH="369484" progId="Excel.Sheet.12">
                   <p:embed/>
                 </p:oleObj>
               </mc:Choice>
@@ -48055,118 +48719,7 @@
 </p:sld>
 </file>
 
-<file path=ppt/slides/slide2.xml><?xml version="1.0" encoding="utf-8"?>
-<p:sld xmlns:a="http://schemas.openxmlformats.org/drawingml/2006/main" xmlns:r="http://schemas.openxmlformats.org/officeDocument/2006/relationships" xmlns:p="http://schemas.openxmlformats.org/presentationml/2006/main">
-  <p:cSld>
-    <p:spTree>
-      <p:nvGrpSpPr>
-        <p:cNvPr id="1" name=""/>
-        <p:cNvGrpSpPr/>
-        <p:nvPr/>
-      </p:nvGrpSpPr>
-      <p:grpSpPr>
-        <a:xfrm>
-          <a:off x="0" y="0"/>
-          <a:ext cx="0" cy="0"/>
-          <a:chOff x="0" y="0"/>
-          <a:chExt cx="0" cy="0"/>
-        </a:xfrm>
-      </p:grpSpPr>
-      <p:sp>
-        <p:nvSpPr>
-          <p:cNvPr id="3" name="Content Placeholder 2">
-            <a:extLst>
-              <a:ext uri="{FF2B5EF4-FFF2-40B4-BE49-F238E27FC236}">
-                <a16:creationId xmlns:a16="http://schemas.microsoft.com/office/drawing/2014/main" id="{D8A3DCC0-BBC8-4671-8CBC-2A231CC18E7F}"/>
-              </a:ext>
-            </a:extLst>
-          </p:cNvPr>
-          <p:cNvSpPr>
-            <a:spLocks noGrp="1"/>
-          </p:cNvSpPr>
-          <p:nvPr>
-            <p:ph idx="1"/>
-          </p:nvPr>
-        </p:nvSpPr>
-        <p:spPr/>
-        <p:txBody>
-          <a:bodyPr>
-            <a:normAutofit lnSpcReduction="10000"/>
-          </a:bodyPr>
-          <a:lstStyle/>
-          <a:p>
-            <a:r>
-              <a:rPr lang="en-GB" dirty="0"/>
-              <a:t>Films/movies are an important art form, a source of popular entertainment, and a powerful medium of expression. </a:t>
-            </a:r>
-            <a:endParaRPr lang="en-US" dirty="0"/>
-          </a:p>
-          <a:p>
-            <a:r>
-              <a:rPr lang="en-US" dirty="0"/>
-              <a:t>It is also an entire industry comprising of </a:t>
-            </a:r>
-            <a:r>
-              <a:rPr lang="en-GB" dirty="0"/>
-              <a:t>film production companies, film studios, cinematography, animation, screenwriting, pre-production, postproduction, film festivals, actors, film directors and other film crew personnel.</a:t>
-            </a:r>
-          </a:p>
-          <a:p>
-            <a:r>
-              <a:rPr lang="en-GB" dirty="0"/>
-              <a:t>The economic impact of the film industry has been exponentially growing over time. The global film industry was worth an estimated $136 billion in 2018. </a:t>
-            </a:r>
-          </a:p>
-          <a:p>
-            <a:r>
-              <a:rPr lang="en-US" dirty="0"/>
-              <a:t>Of all the various factors contributing to the success of a movie, the popularity/traction of the cast tops the list. </a:t>
-            </a:r>
-          </a:p>
-        </p:txBody>
-      </p:sp>
-      <p:sp>
-        <p:nvSpPr>
-          <p:cNvPr id="2" name="Title 1">
-            <a:extLst>
-              <a:ext uri="{FF2B5EF4-FFF2-40B4-BE49-F238E27FC236}">
-                <a16:creationId xmlns:a16="http://schemas.microsoft.com/office/drawing/2014/main" id="{1F8E98EF-5675-49AE-8E43-09BAB23C8F3C}"/>
-              </a:ext>
-            </a:extLst>
-          </p:cNvPr>
-          <p:cNvSpPr>
-            <a:spLocks noGrp="1"/>
-          </p:cNvSpPr>
-          <p:nvPr>
-            <p:ph type="title"/>
-          </p:nvPr>
-        </p:nvSpPr>
-        <p:spPr/>
-        <p:txBody>
-          <a:bodyPr/>
-          <a:lstStyle/>
-          <a:p>
-            <a:r>
-              <a:rPr lang="en-US" dirty="0"/>
-              <a:t>Introduction</a:t>
-            </a:r>
-          </a:p>
-        </p:txBody>
-      </p:sp>
-    </p:spTree>
-    <p:extLst>
-      <p:ext uri="{BB962C8B-B14F-4D97-AF65-F5344CB8AC3E}">
-        <p14:creationId xmlns:p14="http://schemas.microsoft.com/office/powerpoint/2010/main" val="1621250363"/>
-      </p:ext>
-    </p:extLst>
-  </p:cSld>
-  <p:clrMapOvr>
-    <a:masterClrMapping/>
-  </p:clrMapOvr>
-</p:sld>
-</file>
-
-<file path=ppt/slides/slide20.xml><?xml version="1.0" encoding="utf-8"?>
+<file path=ppt/slides/slide21.xml><?xml version="1.0" encoding="utf-8"?>
 <p:sld xmlns:a="http://schemas.openxmlformats.org/drawingml/2006/main" xmlns:r="http://schemas.openxmlformats.org/officeDocument/2006/relationships" xmlns:p="http://schemas.openxmlformats.org/presentationml/2006/main">
   <p:cSld>
     <p:spTree>
@@ -48715,7 +49268,7 @@
 </p:sld>
 </file>
 
-<file path=ppt/slides/slide21.xml><?xml version="1.0" encoding="utf-8"?>
+<file path=ppt/slides/slide22.xml><?xml version="1.0" encoding="utf-8"?>
 <p:sld xmlns:a="http://schemas.openxmlformats.org/drawingml/2006/main" xmlns:r="http://schemas.openxmlformats.org/officeDocument/2006/relationships" xmlns:p="http://schemas.openxmlformats.org/presentationml/2006/main">
   <p:cSld>
     <p:spTree>
@@ -48828,7 +49381,7 @@
 </p:sld>
 </file>
 
-<file path=ppt/slides/slide22.xml><?xml version="1.0" encoding="utf-8"?>
+<file path=ppt/slides/slide23.xml><?xml version="1.0" encoding="utf-8"?>
 <p:sld xmlns:a="http://schemas.openxmlformats.org/drawingml/2006/main" xmlns:r="http://schemas.openxmlformats.org/officeDocument/2006/relationships" xmlns:p="http://schemas.openxmlformats.org/presentationml/2006/main">
   <p:cSld>
     <p:spTree>
@@ -49152,7 +49705,7 @@
 </p:sld>
 </file>
 
-<file path=ppt/slides/slide23.xml><?xml version="1.0" encoding="utf-8"?>
+<file path=ppt/slides/slide24.xml><?xml version="1.0" encoding="utf-8"?>
 <p:sld xmlns:a="http://schemas.openxmlformats.org/drawingml/2006/main" xmlns:r="http://schemas.openxmlformats.org/officeDocument/2006/relationships" xmlns:p="http://schemas.openxmlformats.org/presentationml/2006/main">
   <p:cSld>
     <p:spTree>

</xml_diff>